<commit_message>
Added: 1. Unity Analytics. Changed: 1. Increased Difficulty 2. Made the parallax solid and split the buildings and dimmed.
</commit_message>
<xml_diff>
--- a/Assets/Modi Flappy Bird.pptx
+++ b/Assets/Modi Flappy Bird.pptx
@@ -16,7 +16,9 @@
     <p:sldId id="263" r:id="rId10"/>
     <p:sldId id="265" r:id="rId11"/>
     <p:sldId id="266" r:id="rId12"/>
-    <p:sldId id="267" r:id="rId13"/>
+    <p:sldId id="269" r:id="rId13"/>
+    <p:sldId id="267" r:id="rId14"/>
+    <p:sldId id="268" r:id="rId15"/>
   </p:sldIdLst>
   <p:sldSz cx="12192000" cy="6858000"/>
   <p:notesSz cx="6858000" cy="9144000"/>
@@ -265,7 +267,7 @@
           <a:p>
             <a:fld id="{5EDA0A71-86D3-4786-A507-7E9C05790A64}" type="datetimeFigureOut">
               <a:rPr lang="en-IN" smtClean="0"/>
-              <a:t>22-02-2015</a:t>
+              <a:t>26-02-2015</a:t>
             </a:fld>
             <a:endParaRPr lang="en-IN"/>
           </a:p>
@@ -435,7 +437,7 @@
           <a:p>
             <a:fld id="{5EDA0A71-86D3-4786-A507-7E9C05790A64}" type="datetimeFigureOut">
               <a:rPr lang="en-IN" smtClean="0"/>
-              <a:t>22-02-2015</a:t>
+              <a:t>26-02-2015</a:t>
             </a:fld>
             <a:endParaRPr lang="en-IN"/>
           </a:p>
@@ -615,7 +617,7 @@
           <a:p>
             <a:fld id="{5EDA0A71-86D3-4786-A507-7E9C05790A64}" type="datetimeFigureOut">
               <a:rPr lang="en-IN" smtClean="0"/>
-              <a:t>22-02-2015</a:t>
+              <a:t>26-02-2015</a:t>
             </a:fld>
             <a:endParaRPr lang="en-IN"/>
           </a:p>
@@ -785,7 +787,7 @@
           <a:p>
             <a:fld id="{5EDA0A71-86D3-4786-A507-7E9C05790A64}" type="datetimeFigureOut">
               <a:rPr lang="en-IN" smtClean="0"/>
-              <a:t>22-02-2015</a:t>
+              <a:t>26-02-2015</a:t>
             </a:fld>
             <a:endParaRPr lang="en-IN"/>
           </a:p>
@@ -1031,7 +1033,7 @@
           <a:p>
             <a:fld id="{5EDA0A71-86D3-4786-A507-7E9C05790A64}" type="datetimeFigureOut">
               <a:rPr lang="en-IN" smtClean="0"/>
-              <a:t>22-02-2015</a:t>
+              <a:t>26-02-2015</a:t>
             </a:fld>
             <a:endParaRPr lang="en-IN"/>
           </a:p>
@@ -1263,7 +1265,7 @@
           <a:p>
             <a:fld id="{5EDA0A71-86D3-4786-A507-7E9C05790A64}" type="datetimeFigureOut">
               <a:rPr lang="en-IN" smtClean="0"/>
-              <a:t>22-02-2015</a:t>
+              <a:t>26-02-2015</a:t>
             </a:fld>
             <a:endParaRPr lang="en-IN"/>
           </a:p>
@@ -1630,7 +1632,7 @@
           <a:p>
             <a:fld id="{5EDA0A71-86D3-4786-A507-7E9C05790A64}" type="datetimeFigureOut">
               <a:rPr lang="en-IN" smtClean="0"/>
-              <a:t>22-02-2015</a:t>
+              <a:t>26-02-2015</a:t>
             </a:fld>
             <a:endParaRPr lang="en-IN"/>
           </a:p>
@@ -1748,7 +1750,7 @@
           <a:p>
             <a:fld id="{5EDA0A71-86D3-4786-A507-7E9C05790A64}" type="datetimeFigureOut">
               <a:rPr lang="en-IN" smtClean="0"/>
-              <a:t>22-02-2015</a:t>
+              <a:t>26-02-2015</a:t>
             </a:fld>
             <a:endParaRPr lang="en-IN"/>
           </a:p>
@@ -1843,7 +1845,7 @@
           <a:p>
             <a:fld id="{5EDA0A71-86D3-4786-A507-7E9C05790A64}" type="datetimeFigureOut">
               <a:rPr lang="en-IN" smtClean="0"/>
-              <a:t>22-02-2015</a:t>
+              <a:t>26-02-2015</a:t>
             </a:fld>
             <a:endParaRPr lang="en-IN"/>
           </a:p>
@@ -2120,7 +2122,7 @@
           <a:p>
             <a:fld id="{5EDA0A71-86D3-4786-A507-7E9C05790A64}" type="datetimeFigureOut">
               <a:rPr lang="en-IN" smtClean="0"/>
-              <a:t>22-02-2015</a:t>
+              <a:t>26-02-2015</a:t>
             </a:fld>
             <a:endParaRPr lang="en-IN"/>
           </a:p>
@@ -2373,7 +2375,7 @@
           <a:p>
             <a:fld id="{5EDA0A71-86D3-4786-A507-7E9C05790A64}" type="datetimeFigureOut">
               <a:rPr lang="en-IN" smtClean="0"/>
-              <a:t>22-02-2015</a:t>
+              <a:t>26-02-2015</a:t>
             </a:fld>
             <a:endParaRPr lang="en-IN"/>
           </a:p>
@@ -2586,7 +2588,7 @@
           <a:p>
             <a:fld id="{5EDA0A71-86D3-4786-A507-7E9C05790A64}" type="datetimeFigureOut">
               <a:rPr lang="en-IN" smtClean="0"/>
-              <a:t>22-02-2015</a:t>
+              <a:t>26-02-2015</a:t>
             </a:fld>
             <a:endParaRPr lang="en-IN"/>
           </a:p>
@@ -6519,10 +6521,3094 @@
           <a:chExt cx="0" cy="0"/>
         </a:xfrm>
       </p:grpSpPr>
+      <p:grpSp>
+        <p:nvGrpSpPr>
+          <p:cNvPr id="28" name="Group 27"/>
+          <p:cNvGrpSpPr/>
+          <p:nvPr/>
+        </p:nvGrpSpPr>
+        <p:grpSpPr>
+          <a:xfrm>
+            <a:off x="1759945" y="2758294"/>
+            <a:ext cx="10265462" cy="2131604"/>
+            <a:chOff x="1759945" y="2758294"/>
+            <a:chExt cx="10265462" cy="2131604"/>
+          </a:xfrm>
+        </p:grpSpPr>
+        <p:sp>
+          <p:nvSpPr>
+            <p:cNvPr id="5" name="Rectangle 4"/>
+            <p:cNvSpPr/>
+            <p:nvPr/>
+          </p:nvSpPr>
+          <p:spPr>
+            <a:xfrm>
+              <a:off x="7842083" y="3504141"/>
+              <a:ext cx="1583085" cy="1380900"/>
+            </a:xfrm>
+            <a:prstGeom prst="rect">
+              <a:avLst/>
+            </a:prstGeom>
+            <a:solidFill>
+              <a:srgbClr val="138808"/>
+            </a:solidFill>
+            <a:ln>
+              <a:noFill/>
+            </a:ln>
+            <a:effectLst/>
+          </p:spPr>
+          <p:style>
+            <a:lnRef idx="2">
+              <a:schemeClr val="accent1">
+                <a:shade val="50000"/>
+              </a:schemeClr>
+            </a:lnRef>
+            <a:fillRef idx="1">
+              <a:schemeClr val="accent1"/>
+            </a:fillRef>
+            <a:effectRef idx="0">
+              <a:schemeClr val="accent1"/>
+            </a:effectRef>
+            <a:fontRef idx="minor">
+              <a:schemeClr val="lt1"/>
+            </a:fontRef>
+          </p:style>
+          <p:txBody>
+            <a:bodyPr rtlCol="0" anchor="ctr"/>
+            <a:lstStyle/>
+            <a:p>
+              <a:pPr algn="ctr"/>
+              <a:endParaRPr lang="en-IN"/>
+            </a:p>
+          </p:txBody>
+        </p:sp>
+        <p:sp>
+          <p:nvSpPr>
+            <p:cNvPr id="6" name="Rectangle 5"/>
+            <p:cNvSpPr/>
+            <p:nvPr/>
+          </p:nvSpPr>
+          <p:spPr>
+            <a:xfrm>
+              <a:off x="4556939" y="4027956"/>
+              <a:ext cx="900905" cy="860461"/>
+            </a:xfrm>
+            <a:prstGeom prst="rect">
+              <a:avLst/>
+            </a:prstGeom>
+            <a:solidFill>
+              <a:srgbClr val="138808"/>
+            </a:solidFill>
+            <a:ln>
+              <a:noFill/>
+            </a:ln>
+            <a:effectLst/>
+          </p:spPr>
+          <p:style>
+            <a:lnRef idx="2">
+              <a:schemeClr val="accent1">
+                <a:shade val="50000"/>
+              </a:schemeClr>
+            </a:lnRef>
+            <a:fillRef idx="1">
+              <a:schemeClr val="accent1"/>
+            </a:fillRef>
+            <a:effectRef idx="0">
+              <a:schemeClr val="accent1"/>
+            </a:effectRef>
+            <a:fontRef idx="minor">
+              <a:schemeClr val="lt1"/>
+            </a:fontRef>
+          </p:style>
+          <p:txBody>
+            <a:bodyPr rtlCol="0" anchor="ctr"/>
+            <a:lstStyle/>
+            <a:p>
+              <a:pPr algn="ctr"/>
+              <a:endParaRPr lang="en-IN"/>
+            </a:p>
+          </p:txBody>
+        </p:sp>
+        <p:sp>
+          <p:nvSpPr>
+            <p:cNvPr id="7" name="Rectangle 6"/>
+            <p:cNvSpPr/>
+            <p:nvPr/>
+          </p:nvSpPr>
+          <p:spPr>
+            <a:xfrm>
+              <a:off x="5654057" y="3663198"/>
+              <a:ext cx="686152" cy="1211784"/>
+            </a:xfrm>
+            <a:prstGeom prst="rect">
+              <a:avLst/>
+            </a:prstGeom>
+            <a:solidFill>
+              <a:srgbClr val="138808"/>
+            </a:solidFill>
+            <a:ln>
+              <a:noFill/>
+            </a:ln>
+            <a:effectLst/>
+          </p:spPr>
+          <p:style>
+            <a:lnRef idx="2">
+              <a:schemeClr val="accent1">
+                <a:shade val="50000"/>
+              </a:schemeClr>
+            </a:lnRef>
+            <a:fillRef idx="1">
+              <a:schemeClr val="accent1"/>
+            </a:fillRef>
+            <a:effectRef idx="0">
+              <a:schemeClr val="accent1"/>
+            </a:effectRef>
+            <a:fontRef idx="minor">
+              <a:schemeClr val="lt1"/>
+            </a:fontRef>
+          </p:style>
+          <p:txBody>
+            <a:bodyPr rtlCol="0" anchor="ctr"/>
+            <a:lstStyle/>
+            <a:p>
+              <a:pPr algn="ctr"/>
+              <a:endParaRPr lang="en-IN"/>
+            </a:p>
+          </p:txBody>
+        </p:sp>
+        <p:grpSp>
+          <p:nvGrpSpPr>
+            <p:cNvPr id="8" name="Group 7"/>
+            <p:cNvGrpSpPr/>
+            <p:nvPr/>
+          </p:nvGrpSpPr>
+          <p:grpSpPr>
+            <a:xfrm>
+              <a:off x="3456262" y="3382892"/>
+              <a:ext cx="965161" cy="1507006"/>
+              <a:chOff x="1056000" y="1944000"/>
+              <a:chExt cx="720000" cy="2965129"/>
+            </a:xfrm>
+            <a:solidFill>
+              <a:srgbClr val="138808"/>
+            </a:solidFill>
+            <a:effectLst/>
+          </p:grpSpPr>
+          <p:sp>
+            <p:nvSpPr>
+              <p:cNvPr id="26" name="Rectangle 25"/>
+              <p:cNvSpPr/>
+              <p:nvPr/>
+            </p:nvSpPr>
+            <p:spPr>
+              <a:xfrm>
+                <a:off x="1056000" y="2529000"/>
+                <a:ext cx="720000" cy="2380129"/>
+              </a:xfrm>
+              <a:prstGeom prst="rect">
+                <a:avLst/>
+              </a:prstGeom>
+              <a:grpFill/>
+              <a:ln>
+                <a:noFill/>
+              </a:ln>
+            </p:spPr>
+            <p:style>
+              <a:lnRef idx="2">
+                <a:schemeClr val="accent1">
+                  <a:shade val="50000"/>
+                </a:schemeClr>
+              </a:lnRef>
+              <a:fillRef idx="1">
+                <a:schemeClr val="accent1"/>
+              </a:fillRef>
+              <a:effectRef idx="0">
+                <a:schemeClr val="accent1"/>
+              </a:effectRef>
+              <a:fontRef idx="minor">
+                <a:schemeClr val="lt1"/>
+              </a:fontRef>
+            </p:style>
+            <p:txBody>
+              <a:bodyPr rtlCol="0" anchor="ctr"/>
+              <a:lstStyle/>
+              <a:p>
+                <a:pPr algn="ctr"/>
+                <a:endParaRPr lang="en-IN"/>
+              </a:p>
+            </p:txBody>
+          </p:sp>
+          <p:sp>
+            <p:nvSpPr>
+              <p:cNvPr id="27" name="Isosceles Triangle 26"/>
+              <p:cNvSpPr/>
+              <p:nvPr/>
+            </p:nvSpPr>
+            <p:spPr>
+              <a:xfrm>
+                <a:off x="1056000" y="1944000"/>
+                <a:ext cx="720000" cy="596153"/>
+              </a:xfrm>
+              <a:prstGeom prst="triangle">
+                <a:avLst/>
+              </a:prstGeom>
+              <a:grpFill/>
+              <a:ln>
+                <a:noFill/>
+              </a:ln>
+            </p:spPr>
+            <p:style>
+              <a:lnRef idx="2">
+                <a:schemeClr val="accent1">
+                  <a:shade val="50000"/>
+                </a:schemeClr>
+              </a:lnRef>
+              <a:fillRef idx="1">
+                <a:schemeClr val="accent1"/>
+              </a:fillRef>
+              <a:effectRef idx="0">
+                <a:schemeClr val="accent1"/>
+              </a:effectRef>
+              <a:fontRef idx="minor">
+                <a:schemeClr val="lt1"/>
+              </a:fontRef>
+            </p:style>
+            <p:txBody>
+              <a:bodyPr rtlCol="0" anchor="ctr"/>
+              <a:lstStyle/>
+              <a:p>
+                <a:pPr algn="ctr"/>
+                <a:endParaRPr lang="en-IN"/>
+              </a:p>
+            </p:txBody>
+          </p:sp>
+        </p:grpSp>
+        <p:grpSp>
+          <p:nvGrpSpPr>
+            <p:cNvPr id="9" name="Group 8"/>
+            <p:cNvGrpSpPr/>
+            <p:nvPr/>
+          </p:nvGrpSpPr>
+          <p:grpSpPr>
+            <a:xfrm>
+              <a:off x="2592393" y="3534387"/>
+              <a:ext cx="720000" cy="1350975"/>
+              <a:chOff x="8975701" y="1618958"/>
+              <a:chExt cx="720000" cy="3241483"/>
+            </a:xfrm>
+            <a:solidFill>
+              <a:srgbClr val="138808"/>
+            </a:solidFill>
+            <a:effectLst/>
+          </p:grpSpPr>
+          <p:sp>
+            <p:nvSpPr>
+              <p:cNvPr id="24" name="Rectangle 23"/>
+              <p:cNvSpPr/>
+              <p:nvPr/>
+            </p:nvSpPr>
+            <p:spPr>
+              <a:xfrm>
+                <a:off x="8975701" y="1618958"/>
+                <a:ext cx="720000" cy="3241483"/>
+              </a:xfrm>
+              <a:prstGeom prst="rect">
+                <a:avLst/>
+              </a:prstGeom>
+              <a:grpFill/>
+              <a:ln>
+                <a:noFill/>
+              </a:ln>
+            </p:spPr>
+            <p:style>
+              <a:lnRef idx="2">
+                <a:schemeClr val="accent1">
+                  <a:shade val="50000"/>
+                </a:schemeClr>
+              </a:lnRef>
+              <a:fillRef idx="1">
+                <a:schemeClr val="accent1"/>
+              </a:fillRef>
+              <a:effectRef idx="0">
+                <a:schemeClr val="accent1"/>
+              </a:effectRef>
+              <a:fontRef idx="minor">
+                <a:schemeClr val="lt1"/>
+              </a:fontRef>
+            </p:style>
+            <p:txBody>
+              <a:bodyPr rtlCol="0" anchor="ctr"/>
+              <a:lstStyle/>
+              <a:p>
+                <a:pPr algn="ctr"/>
+                <a:endParaRPr lang="en-IN"/>
+              </a:p>
+            </p:txBody>
+          </p:sp>
+          <p:sp>
+            <p:nvSpPr>
+              <p:cNvPr id="25" name="Trapezoid 24"/>
+              <p:cNvSpPr/>
+              <p:nvPr/>
+            </p:nvSpPr>
+            <p:spPr>
+              <a:xfrm>
+                <a:off x="9178746" y="1941989"/>
+                <a:ext cx="239877" cy="168807"/>
+              </a:xfrm>
+              <a:prstGeom prst="trapezoid">
+                <a:avLst>
+                  <a:gd name="adj" fmla="val 95532"/>
+                </a:avLst>
+              </a:prstGeom>
+              <a:grpFill/>
+              <a:ln>
+                <a:noFill/>
+              </a:ln>
+            </p:spPr>
+            <p:style>
+              <a:lnRef idx="2">
+                <a:schemeClr val="accent1">
+                  <a:shade val="50000"/>
+                </a:schemeClr>
+              </a:lnRef>
+              <a:fillRef idx="1">
+                <a:schemeClr val="accent1"/>
+              </a:fillRef>
+              <a:effectRef idx="0">
+                <a:schemeClr val="accent1"/>
+              </a:effectRef>
+              <a:fontRef idx="minor">
+                <a:schemeClr val="lt1"/>
+              </a:fontRef>
+            </p:style>
+            <p:txBody>
+              <a:bodyPr rtlCol="0" anchor="ctr"/>
+              <a:lstStyle/>
+              <a:p>
+                <a:pPr algn="ctr"/>
+                <a:endParaRPr lang="en-IN"/>
+              </a:p>
+            </p:txBody>
+          </p:sp>
+        </p:grpSp>
+        <p:grpSp>
+          <p:nvGrpSpPr>
+            <p:cNvPr id="10" name="Group 9"/>
+            <p:cNvGrpSpPr/>
+            <p:nvPr/>
+          </p:nvGrpSpPr>
+          <p:grpSpPr>
+            <a:xfrm>
+              <a:off x="9606000" y="2758294"/>
+              <a:ext cx="1215000" cy="2126747"/>
+              <a:chOff x="2496000" y="583509"/>
+              <a:chExt cx="720000" cy="4303914"/>
+            </a:xfrm>
+            <a:solidFill>
+              <a:srgbClr val="138808"/>
+            </a:solidFill>
+            <a:effectLst/>
+          </p:grpSpPr>
+          <p:sp>
+            <p:nvSpPr>
+              <p:cNvPr id="21" name="Rectangle 20"/>
+              <p:cNvSpPr/>
+              <p:nvPr/>
+            </p:nvSpPr>
+            <p:spPr>
+              <a:xfrm>
+                <a:off x="2496000" y="1269000"/>
+                <a:ext cx="720000" cy="3618423"/>
+              </a:xfrm>
+              <a:prstGeom prst="rect">
+                <a:avLst/>
+              </a:prstGeom>
+              <a:grpFill/>
+              <a:ln>
+                <a:noFill/>
+              </a:ln>
+            </p:spPr>
+            <p:style>
+              <a:lnRef idx="2">
+                <a:schemeClr val="accent1">
+                  <a:shade val="50000"/>
+                </a:schemeClr>
+              </a:lnRef>
+              <a:fillRef idx="1">
+                <a:schemeClr val="accent1"/>
+              </a:fillRef>
+              <a:effectRef idx="0">
+                <a:schemeClr val="accent1"/>
+              </a:effectRef>
+              <a:fontRef idx="minor">
+                <a:schemeClr val="lt1"/>
+              </a:fontRef>
+            </p:style>
+            <p:txBody>
+              <a:bodyPr rtlCol="0" anchor="ctr"/>
+              <a:lstStyle/>
+              <a:p>
+                <a:pPr algn="ctr"/>
+                <a:endParaRPr lang="en-IN"/>
+              </a:p>
+            </p:txBody>
+          </p:sp>
+          <p:sp>
+            <p:nvSpPr>
+              <p:cNvPr id="22" name="Rectangle 21"/>
+              <p:cNvSpPr/>
+              <p:nvPr/>
+            </p:nvSpPr>
+            <p:spPr>
+              <a:xfrm flipV="1">
+                <a:off x="2631000" y="583509"/>
+                <a:ext cx="27093" cy="792891"/>
+              </a:xfrm>
+              <a:prstGeom prst="rect">
+                <a:avLst/>
+              </a:prstGeom>
+              <a:grpFill/>
+              <a:ln>
+                <a:noFill/>
+              </a:ln>
+            </p:spPr>
+            <p:style>
+              <a:lnRef idx="2">
+                <a:schemeClr val="accent1">
+                  <a:shade val="50000"/>
+                </a:schemeClr>
+              </a:lnRef>
+              <a:fillRef idx="1">
+                <a:schemeClr val="accent1"/>
+              </a:fillRef>
+              <a:effectRef idx="0">
+                <a:schemeClr val="accent1"/>
+              </a:effectRef>
+              <a:fontRef idx="minor">
+                <a:schemeClr val="lt1"/>
+              </a:fontRef>
+            </p:style>
+            <p:txBody>
+              <a:bodyPr rtlCol="0" anchor="ctr"/>
+              <a:lstStyle/>
+              <a:p>
+                <a:pPr algn="ctr"/>
+                <a:endParaRPr lang="en-IN"/>
+              </a:p>
+            </p:txBody>
+          </p:sp>
+        </p:grpSp>
+        <p:grpSp>
+          <p:nvGrpSpPr>
+            <p:cNvPr id="11" name="Group 10"/>
+            <p:cNvGrpSpPr/>
+            <p:nvPr/>
+          </p:nvGrpSpPr>
+          <p:grpSpPr>
+            <a:xfrm>
+              <a:off x="6502600" y="3167610"/>
+              <a:ext cx="1032791" cy="1717431"/>
+              <a:chOff x="7953456" y="595842"/>
+              <a:chExt cx="720000" cy="4248708"/>
+            </a:xfrm>
+            <a:solidFill>
+              <a:srgbClr val="138808"/>
+            </a:solidFill>
+            <a:effectLst/>
+          </p:grpSpPr>
+          <p:sp>
+            <p:nvSpPr>
+              <p:cNvPr id="19" name="Rectangle 18"/>
+              <p:cNvSpPr/>
+              <p:nvPr/>
+            </p:nvSpPr>
+            <p:spPr>
+              <a:xfrm>
+                <a:off x="7953456" y="878091"/>
+                <a:ext cx="720000" cy="3966459"/>
+              </a:xfrm>
+              <a:prstGeom prst="rect">
+                <a:avLst/>
+              </a:prstGeom>
+              <a:grpFill/>
+              <a:ln>
+                <a:noFill/>
+              </a:ln>
+            </p:spPr>
+            <p:style>
+              <a:lnRef idx="2">
+                <a:schemeClr val="accent1">
+                  <a:shade val="50000"/>
+                </a:schemeClr>
+              </a:lnRef>
+              <a:fillRef idx="1">
+                <a:schemeClr val="accent1"/>
+              </a:fillRef>
+              <a:effectRef idx="0">
+                <a:schemeClr val="accent1"/>
+              </a:effectRef>
+              <a:fontRef idx="minor">
+                <a:schemeClr val="lt1"/>
+              </a:fontRef>
+            </p:style>
+            <p:txBody>
+              <a:bodyPr rtlCol="0" anchor="ctr"/>
+              <a:lstStyle/>
+              <a:p>
+                <a:pPr algn="ctr"/>
+                <a:endParaRPr lang="en-IN"/>
+              </a:p>
+            </p:txBody>
+          </p:sp>
+          <p:sp>
+            <p:nvSpPr>
+              <p:cNvPr id="20" name="Rectangle 43"/>
+              <p:cNvSpPr/>
+              <p:nvPr/>
+            </p:nvSpPr>
+            <p:spPr>
+              <a:xfrm>
+                <a:off x="7953456" y="595842"/>
+                <a:ext cx="706824" cy="314301"/>
+              </a:xfrm>
+              <a:prstGeom prst="rtTriangle">
+                <a:avLst/>
+              </a:prstGeom>
+              <a:grpFill/>
+              <a:ln>
+                <a:noFill/>
+              </a:ln>
+            </p:spPr>
+            <p:style>
+              <a:lnRef idx="2">
+                <a:schemeClr val="accent1">
+                  <a:shade val="50000"/>
+                </a:schemeClr>
+              </a:lnRef>
+              <a:fillRef idx="1">
+                <a:schemeClr val="accent1"/>
+              </a:fillRef>
+              <a:effectRef idx="0">
+                <a:schemeClr val="accent1"/>
+              </a:effectRef>
+              <a:fontRef idx="minor">
+                <a:schemeClr val="lt1"/>
+              </a:fontRef>
+            </p:style>
+            <p:txBody>
+              <a:bodyPr rtlCol="0" anchor="ctr"/>
+              <a:lstStyle/>
+              <a:p>
+                <a:pPr algn="ctr"/>
+                <a:endParaRPr lang="en-IN"/>
+              </a:p>
+            </p:txBody>
+          </p:sp>
+        </p:grpSp>
+        <p:grpSp>
+          <p:nvGrpSpPr>
+            <p:cNvPr id="12" name="Group 11"/>
+            <p:cNvGrpSpPr/>
+            <p:nvPr/>
+          </p:nvGrpSpPr>
+          <p:grpSpPr>
+            <a:xfrm>
+              <a:off x="10992616" y="3373378"/>
+              <a:ext cx="1032791" cy="1513211"/>
+              <a:chOff x="7959750" y="564500"/>
+              <a:chExt cx="720000" cy="4275333"/>
+            </a:xfrm>
+            <a:solidFill>
+              <a:srgbClr val="138808"/>
+            </a:solidFill>
+            <a:effectLst/>
+          </p:grpSpPr>
+          <p:sp>
+            <p:nvSpPr>
+              <p:cNvPr id="17" name="Rectangle 16"/>
+              <p:cNvSpPr/>
+              <p:nvPr/>
+            </p:nvSpPr>
+            <p:spPr>
+              <a:xfrm>
+                <a:off x="7959750" y="873372"/>
+                <a:ext cx="720000" cy="3966461"/>
+              </a:xfrm>
+              <a:prstGeom prst="rect">
+                <a:avLst/>
+              </a:prstGeom>
+              <a:grpFill/>
+              <a:ln>
+                <a:noFill/>
+              </a:ln>
+            </p:spPr>
+            <p:style>
+              <a:lnRef idx="2">
+                <a:schemeClr val="accent1">
+                  <a:shade val="50000"/>
+                </a:schemeClr>
+              </a:lnRef>
+              <a:fillRef idx="1">
+                <a:schemeClr val="accent1"/>
+              </a:fillRef>
+              <a:effectRef idx="0">
+                <a:schemeClr val="accent1"/>
+              </a:effectRef>
+              <a:fontRef idx="minor">
+                <a:schemeClr val="lt1"/>
+              </a:fontRef>
+            </p:style>
+            <p:txBody>
+              <a:bodyPr rtlCol="0" anchor="ctr"/>
+              <a:lstStyle/>
+              <a:p>
+                <a:pPr algn="ctr"/>
+                <a:endParaRPr lang="en-IN"/>
+              </a:p>
+            </p:txBody>
+          </p:sp>
+          <p:sp>
+            <p:nvSpPr>
+              <p:cNvPr id="18" name="Rectangle 43"/>
+              <p:cNvSpPr/>
+              <p:nvPr/>
+            </p:nvSpPr>
+            <p:spPr>
+              <a:xfrm>
+                <a:off x="7959750" y="564500"/>
+                <a:ext cx="710300" cy="314299"/>
+              </a:xfrm>
+              <a:prstGeom prst="rtTriangle">
+                <a:avLst/>
+              </a:prstGeom>
+              <a:grpFill/>
+              <a:ln>
+                <a:noFill/>
+              </a:ln>
+            </p:spPr>
+            <p:style>
+              <a:lnRef idx="2">
+                <a:schemeClr val="accent1">
+                  <a:shade val="50000"/>
+                </a:schemeClr>
+              </a:lnRef>
+              <a:fillRef idx="1">
+                <a:schemeClr val="accent1"/>
+              </a:fillRef>
+              <a:effectRef idx="0">
+                <a:schemeClr val="accent1"/>
+              </a:effectRef>
+              <a:fontRef idx="minor">
+                <a:schemeClr val="lt1"/>
+              </a:fontRef>
+            </p:style>
+            <p:txBody>
+              <a:bodyPr rtlCol="0" anchor="ctr"/>
+              <a:lstStyle/>
+              <a:p>
+                <a:pPr algn="ctr"/>
+                <a:endParaRPr lang="en-IN"/>
+              </a:p>
+            </p:txBody>
+          </p:sp>
+        </p:grpSp>
+        <p:grpSp>
+          <p:nvGrpSpPr>
+            <p:cNvPr id="13" name="Group 12"/>
+            <p:cNvGrpSpPr/>
+            <p:nvPr/>
+          </p:nvGrpSpPr>
+          <p:grpSpPr>
+            <a:xfrm>
+              <a:off x="1759945" y="3879193"/>
+              <a:ext cx="720000" cy="995789"/>
+              <a:chOff x="9895543" y="1369899"/>
+              <a:chExt cx="720000" cy="995789"/>
+            </a:xfrm>
+            <a:solidFill>
+              <a:srgbClr val="138808"/>
+            </a:solidFill>
+          </p:grpSpPr>
+          <p:sp>
+            <p:nvSpPr>
+              <p:cNvPr id="14" name="Trapezoid 13"/>
+              <p:cNvSpPr/>
+              <p:nvPr/>
+            </p:nvSpPr>
+            <p:spPr>
+              <a:xfrm>
+                <a:off x="9895543" y="1548363"/>
+                <a:ext cx="720000" cy="206562"/>
+              </a:xfrm>
+              <a:prstGeom prst="trapezoid">
+                <a:avLst>
+                  <a:gd name="adj" fmla="val 95532"/>
+                </a:avLst>
+              </a:prstGeom>
+              <a:grpFill/>
+              <a:ln>
+                <a:noFill/>
+              </a:ln>
+            </p:spPr>
+            <p:style>
+              <a:lnRef idx="2">
+                <a:schemeClr val="accent1">
+                  <a:shade val="50000"/>
+                </a:schemeClr>
+              </a:lnRef>
+              <a:fillRef idx="1">
+                <a:schemeClr val="accent1"/>
+              </a:fillRef>
+              <a:effectRef idx="0">
+                <a:schemeClr val="accent1"/>
+              </a:effectRef>
+              <a:fontRef idx="minor">
+                <a:schemeClr val="lt1"/>
+              </a:fontRef>
+            </p:style>
+            <p:txBody>
+              <a:bodyPr rtlCol="0" anchor="ctr"/>
+              <a:lstStyle/>
+              <a:p>
+                <a:pPr algn="r"/>
+                <a:endParaRPr lang="en-IN"/>
+              </a:p>
+            </p:txBody>
+          </p:sp>
+          <p:sp>
+            <p:nvSpPr>
+              <p:cNvPr id="15" name="Rectangle 14"/>
+              <p:cNvSpPr/>
+              <p:nvPr/>
+            </p:nvSpPr>
+            <p:spPr>
+              <a:xfrm>
+                <a:off x="9895543" y="1754925"/>
+                <a:ext cx="720000" cy="610763"/>
+              </a:xfrm>
+              <a:prstGeom prst="rect">
+                <a:avLst/>
+              </a:prstGeom>
+              <a:grpFill/>
+              <a:ln>
+                <a:noFill/>
+              </a:ln>
+            </p:spPr>
+            <p:style>
+              <a:lnRef idx="2">
+                <a:schemeClr val="accent1">
+                  <a:shade val="50000"/>
+                </a:schemeClr>
+              </a:lnRef>
+              <a:fillRef idx="1">
+                <a:schemeClr val="accent1"/>
+              </a:fillRef>
+              <a:effectRef idx="0">
+                <a:schemeClr val="accent1"/>
+              </a:effectRef>
+              <a:fontRef idx="minor">
+                <a:schemeClr val="lt1"/>
+              </a:fontRef>
+            </p:style>
+            <p:txBody>
+              <a:bodyPr rtlCol="0" anchor="ctr"/>
+              <a:lstStyle/>
+              <a:p>
+                <a:pPr algn="r"/>
+                <a:endParaRPr lang="en-IN"/>
+              </a:p>
+            </p:txBody>
+          </p:sp>
+          <p:sp>
+            <p:nvSpPr>
+              <p:cNvPr id="16" name="Trapezoid 15"/>
+              <p:cNvSpPr/>
+              <p:nvPr/>
+            </p:nvSpPr>
+            <p:spPr>
+              <a:xfrm>
+                <a:off x="10135604" y="1369899"/>
+                <a:ext cx="239877" cy="206562"/>
+              </a:xfrm>
+              <a:prstGeom prst="trapezoid">
+                <a:avLst>
+                  <a:gd name="adj" fmla="val 95532"/>
+                </a:avLst>
+              </a:prstGeom>
+              <a:grpFill/>
+              <a:ln>
+                <a:noFill/>
+              </a:ln>
+            </p:spPr>
+            <p:style>
+              <a:lnRef idx="2">
+                <a:schemeClr val="accent1">
+                  <a:shade val="50000"/>
+                </a:schemeClr>
+              </a:lnRef>
+              <a:fillRef idx="1">
+                <a:schemeClr val="accent1"/>
+              </a:fillRef>
+              <a:effectRef idx="0">
+                <a:schemeClr val="accent1"/>
+              </a:effectRef>
+              <a:fontRef idx="minor">
+                <a:schemeClr val="lt1"/>
+              </a:fontRef>
+            </p:style>
+            <p:txBody>
+              <a:bodyPr rtlCol="0" anchor="ctr"/>
+              <a:lstStyle/>
+              <a:p>
+                <a:pPr algn="r"/>
+                <a:endParaRPr lang="en-IN"/>
+              </a:p>
+            </p:txBody>
+          </p:sp>
+        </p:grpSp>
+      </p:grpSp>
+    </p:spTree>
+    <p:extLst>
+      <p:ext uri="{BB962C8B-B14F-4D97-AF65-F5344CB8AC3E}">
+        <p14:creationId xmlns:p14="http://schemas.microsoft.com/office/powerpoint/2010/main" val="1168244640"/>
+      </p:ext>
+    </p:extLst>
+  </p:cSld>
+  <p:clrMapOvr>
+    <a:masterClrMapping/>
+  </p:clrMapOvr>
+  <p:timing>
+    <p:tnLst>
+      <p:par>
+        <p:cTn id="1" dur="indefinite" restart="never" nodeType="tmRoot"/>
+      </p:par>
+    </p:tnLst>
+  </p:timing>
+</p:sld>
+</file>
+
+<file path=ppt/slides/slide13.xml><?xml version="1.0" encoding="utf-8"?>
+<p:sld xmlns:a="http://schemas.openxmlformats.org/drawingml/2006/main" xmlns:r="http://schemas.openxmlformats.org/officeDocument/2006/relationships" xmlns:p="http://schemas.openxmlformats.org/presentationml/2006/main">
+  <p:cSld>
+    <p:spTree>
+      <p:nvGrpSpPr>
+        <p:cNvPr id="1" name=""/>
+        <p:cNvGrpSpPr/>
+        <p:nvPr/>
+      </p:nvGrpSpPr>
+      <p:grpSpPr>
+        <a:xfrm>
+          <a:off x="0" y="0"/>
+          <a:ext cx="0" cy="0"/>
+          <a:chOff x="0" y="0"/>
+          <a:chExt cx="0" cy="0"/>
+        </a:xfrm>
+      </p:grpSpPr>
+      <p:grpSp>
+        <p:nvGrpSpPr>
+          <p:cNvPr id="39" name="Group 38"/>
+          <p:cNvGrpSpPr/>
+          <p:nvPr/>
+        </p:nvGrpSpPr>
+        <p:grpSpPr>
+          <a:xfrm>
+            <a:off x="1811416" y="347037"/>
+            <a:ext cx="9732950" cy="4551197"/>
+            <a:chOff x="1811416" y="347037"/>
+            <a:chExt cx="9732950" cy="4551197"/>
+          </a:xfrm>
+        </p:grpSpPr>
+        <p:sp>
+          <p:nvSpPr>
+            <p:cNvPr id="3" name="Rectangle 2"/>
+            <p:cNvSpPr/>
+            <p:nvPr/>
+          </p:nvSpPr>
+          <p:spPr>
+            <a:xfrm>
+              <a:off x="8526000" y="2302822"/>
+              <a:ext cx="720000" cy="2594329"/>
+            </a:xfrm>
+            <a:prstGeom prst="rect">
+              <a:avLst/>
+            </a:prstGeom>
+            <a:solidFill>
+              <a:srgbClr val="FF9933"/>
+            </a:solidFill>
+            <a:ln>
+              <a:noFill/>
+            </a:ln>
+          </p:spPr>
+          <p:style>
+            <a:lnRef idx="2">
+              <a:schemeClr val="accent1">
+                <a:shade val="50000"/>
+              </a:schemeClr>
+            </a:lnRef>
+            <a:fillRef idx="1">
+              <a:schemeClr val="accent1"/>
+            </a:fillRef>
+            <a:effectRef idx="0">
+              <a:schemeClr val="accent1"/>
+            </a:effectRef>
+            <a:fontRef idx="minor">
+              <a:schemeClr val="lt1"/>
+            </a:fontRef>
+          </p:style>
+          <p:txBody>
+            <a:bodyPr rtlCol="0" anchor="ctr"/>
+            <a:lstStyle/>
+            <a:p>
+              <a:pPr algn="r"/>
+              <a:endParaRPr lang="en-IN"/>
+            </a:p>
+          </p:txBody>
+        </p:sp>
+        <p:grpSp>
+          <p:nvGrpSpPr>
+            <p:cNvPr id="4" name="Group 3"/>
+            <p:cNvGrpSpPr/>
+            <p:nvPr/>
+          </p:nvGrpSpPr>
+          <p:grpSpPr>
+            <a:xfrm>
+              <a:off x="9442754" y="1199591"/>
+              <a:ext cx="1184858" cy="3697560"/>
+              <a:chOff x="3936000" y="2446334"/>
+              <a:chExt cx="1080000" cy="2422666"/>
+            </a:xfrm>
+          </p:grpSpPr>
+          <p:sp>
+            <p:nvSpPr>
+              <p:cNvPr id="37" name="Rectangle 36"/>
+              <p:cNvSpPr/>
+              <p:nvPr/>
+            </p:nvSpPr>
+            <p:spPr>
+              <a:xfrm>
+                <a:off x="3936000" y="2979000"/>
+                <a:ext cx="1080000" cy="1890000"/>
+              </a:xfrm>
+              <a:prstGeom prst="rect">
+                <a:avLst/>
+              </a:prstGeom>
+              <a:solidFill>
+                <a:srgbClr val="FF9933"/>
+              </a:solidFill>
+              <a:ln>
+                <a:noFill/>
+              </a:ln>
+            </p:spPr>
+            <p:style>
+              <a:lnRef idx="2">
+                <a:schemeClr val="accent1">
+                  <a:shade val="50000"/>
+                </a:schemeClr>
+              </a:lnRef>
+              <a:fillRef idx="1">
+                <a:schemeClr val="accent1"/>
+              </a:fillRef>
+              <a:effectRef idx="0">
+                <a:schemeClr val="accent1"/>
+              </a:effectRef>
+              <a:fontRef idx="minor">
+                <a:schemeClr val="lt1"/>
+              </a:fontRef>
+            </p:style>
+            <p:txBody>
+              <a:bodyPr rtlCol="0" anchor="ctr"/>
+              <a:lstStyle/>
+              <a:p>
+                <a:pPr algn="r"/>
+                <a:endParaRPr lang="en-IN"/>
+              </a:p>
+            </p:txBody>
+          </p:sp>
+          <p:sp>
+            <p:nvSpPr>
+              <p:cNvPr id="38" name="Isosceles Triangle 37"/>
+              <p:cNvSpPr/>
+              <p:nvPr/>
+            </p:nvSpPr>
+            <p:spPr>
+              <a:xfrm>
+                <a:off x="4074829" y="2446334"/>
+                <a:ext cx="802342" cy="545475"/>
+              </a:xfrm>
+              <a:prstGeom prst="triangle">
+                <a:avLst/>
+              </a:prstGeom>
+              <a:solidFill>
+                <a:srgbClr val="FF9933"/>
+              </a:solidFill>
+              <a:ln>
+                <a:noFill/>
+              </a:ln>
+            </p:spPr>
+            <p:style>
+              <a:lnRef idx="2">
+                <a:schemeClr val="accent1">
+                  <a:shade val="50000"/>
+                </a:schemeClr>
+              </a:lnRef>
+              <a:fillRef idx="1">
+                <a:schemeClr val="accent1"/>
+              </a:fillRef>
+              <a:effectRef idx="0">
+                <a:schemeClr val="accent1"/>
+              </a:effectRef>
+              <a:fontRef idx="minor">
+                <a:schemeClr val="lt1"/>
+              </a:fontRef>
+            </p:style>
+            <p:txBody>
+              <a:bodyPr rtlCol="0" anchor="ctr"/>
+              <a:lstStyle/>
+              <a:p>
+                <a:pPr algn="r"/>
+                <a:endParaRPr lang="en-IN"/>
+              </a:p>
+            </p:txBody>
+          </p:sp>
+        </p:grpSp>
+        <p:grpSp>
+          <p:nvGrpSpPr>
+            <p:cNvPr id="5" name="Group 4"/>
+            <p:cNvGrpSpPr/>
+            <p:nvPr/>
+          </p:nvGrpSpPr>
+          <p:grpSpPr>
+            <a:xfrm>
+              <a:off x="4358584" y="569766"/>
+              <a:ext cx="1215000" cy="4303914"/>
+              <a:chOff x="2496000" y="583509"/>
+              <a:chExt cx="720000" cy="4303914"/>
+            </a:xfrm>
+          </p:grpSpPr>
+          <p:sp>
+            <p:nvSpPr>
+              <p:cNvPr id="35" name="Rectangle 34"/>
+              <p:cNvSpPr/>
+              <p:nvPr/>
+            </p:nvSpPr>
+            <p:spPr>
+              <a:xfrm>
+                <a:off x="2496000" y="1269000"/>
+                <a:ext cx="720000" cy="3618423"/>
+              </a:xfrm>
+              <a:prstGeom prst="rect">
+                <a:avLst/>
+              </a:prstGeom>
+              <a:solidFill>
+                <a:srgbClr val="FF9933"/>
+              </a:solidFill>
+              <a:ln>
+                <a:noFill/>
+              </a:ln>
+            </p:spPr>
+            <p:style>
+              <a:lnRef idx="2">
+                <a:schemeClr val="accent1">
+                  <a:shade val="50000"/>
+                </a:schemeClr>
+              </a:lnRef>
+              <a:fillRef idx="1">
+                <a:schemeClr val="accent1"/>
+              </a:fillRef>
+              <a:effectRef idx="0">
+                <a:schemeClr val="accent1"/>
+              </a:effectRef>
+              <a:fontRef idx="minor">
+                <a:schemeClr val="lt1"/>
+              </a:fontRef>
+            </p:style>
+            <p:txBody>
+              <a:bodyPr rtlCol="0" anchor="ctr"/>
+              <a:lstStyle/>
+              <a:p>
+                <a:pPr algn="r"/>
+                <a:endParaRPr lang="en-IN"/>
+              </a:p>
+            </p:txBody>
+          </p:sp>
+          <p:sp>
+            <p:nvSpPr>
+              <p:cNvPr id="36" name="Rectangle 35"/>
+              <p:cNvSpPr/>
+              <p:nvPr/>
+            </p:nvSpPr>
+            <p:spPr>
+              <a:xfrm flipV="1">
+                <a:off x="2631000" y="583509"/>
+                <a:ext cx="27093" cy="792891"/>
+              </a:xfrm>
+              <a:prstGeom prst="rect">
+                <a:avLst/>
+              </a:prstGeom>
+              <a:solidFill>
+                <a:srgbClr val="FF9933"/>
+              </a:solidFill>
+              <a:ln>
+                <a:noFill/>
+              </a:ln>
+            </p:spPr>
+            <p:style>
+              <a:lnRef idx="2">
+                <a:schemeClr val="accent1">
+                  <a:shade val="50000"/>
+                </a:schemeClr>
+              </a:lnRef>
+              <a:fillRef idx="1">
+                <a:schemeClr val="accent1"/>
+              </a:fillRef>
+              <a:effectRef idx="0">
+                <a:schemeClr val="accent1"/>
+              </a:effectRef>
+              <a:fontRef idx="minor">
+                <a:schemeClr val="lt1"/>
+              </a:fontRef>
+            </p:style>
+            <p:txBody>
+              <a:bodyPr rtlCol="0" anchor="ctr"/>
+              <a:lstStyle/>
+              <a:p>
+                <a:pPr algn="r"/>
+                <a:endParaRPr lang="en-IN"/>
+              </a:p>
+            </p:txBody>
+          </p:sp>
+        </p:grpSp>
+        <p:grpSp>
+          <p:nvGrpSpPr>
+            <p:cNvPr id="6" name="Group 5"/>
+            <p:cNvGrpSpPr/>
+            <p:nvPr/>
+          </p:nvGrpSpPr>
+          <p:grpSpPr>
+            <a:xfrm>
+              <a:off x="3496091" y="1548551"/>
+              <a:ext cx="720000" cy="3325129"/>
+              <a:chOff x="1056000" y="1584000"/>
+              <a:chExt cx="720000" cy="3325129"/>
+            </a:xfrm>
+          </p:grpSpPr>
+          <p:sp>
+            <p:nvSpPr>
+              <p:cNvPr id="32" name="Rectangle 31"/>
+              <p:cNvSpPr/>
+              <p:nvPr/>
+            </p:nvSpPr>
+            <p:spPr>
+              <a:xfrm>
+                <a:off x="1056000" y="2529000"/>
+                <a:ext cx="720000" cy="2380129"/>
+              </a:xfrm>
+              <a:prstGeom prst="rect">
+                <a:avLst/>
+              </a:prstGeom>
+              <a:solidFill>
+                <a:srgbClr val="FF9933"/>
+              </a:solidFill>
+              <a:ln>
+                <a:noFill/>
+              </a:ln>
+            </p:spPr>
+            <p:style>
+              <a:lnRef idx="2">
+                <a:schemeClr val="accent1">
+                  <a:shade val="50000"/>
+                </a:schemeClr>
+              </a:lnRef>
+              <a:fillRef idx="1">
+                <a:schemeClr val="accent1"/>
+              </a:fillRef>
+              <a:effectRef idx="0">
+                <a:schemeClr val="accent1"/>
+              </a:effectRef>
+              <a:fontRef idx="minor">
+                <a:schemeClr val="lt1"/>
+              </a:fontRef>
+            </p:style>
+            <p:txBody>
+              <a:bodyPr rtlCol="0" anchor="ctr"/>
+              <a:lstStyle/>
+              <a:p>
+                <a:pPr algn="r"/>
+                <a:endParaRPr lang="en-IN"/>
+              </a:p>
+            </p:txBody>
+          </p:sp>
+          <p:sp>
+            <p:nvSpPr>
+              <p:cNvPr id="33" name="Isosceles Triangle 32"/>
+              <p:cNvSpPr/>
+              <p:nvPr/>
+            </p:nvSpPr>
+            <p:spPr>
+              <a:xfrm>
+                <a:off x="1056000" y="1944000"/>
+                <a:ext cx="720000" cy="596153"/>
+              </a:xfrm>
+              <a:prstGeom prst="triangle">
+                <a:avLst/>
+              </a:prstGeom>
+              <a:solidFill>
+                <a:srgbClr val="FF9933"/>
+              </a:solidFill>
+              <a:ln>
+                <a:noFill/>
+              </a:ln>
+            </p:spPr>
+            <p:style>
+              <a:lnRef idx="2">
+                <a:schemeClr val="accent1">
+                  <a:shade val="50000"/>
+                </a:schemeClr>
+              </a:lnRef>
+              <a:fillRef idx="1">
+                <a:schemeClr val="accent1"/>
+              </a:fillRef>
+              <a:effectRef idx="0">
+                <a:schemeClr val="accent1"/>
+              </a:effectRef>
+              <a:fontRef idx="minor">
+                <a:schemeClr val="lt1"/>
+              </a:fontRef>
+            </p:style>
+            <p:txBody>
+              <a:bodyPr rtlCol="0" anchor="ctr"/>
+              <a:lstStyle/>
+              <a:p>
+                <a:pPr algn="r"/>
+                <a:endParaRPr lang="en-IN"/>
+              </a:p>
+            </p:txBody>
+          </p:sp>
+          <p:sp>
+            <p:nvSpPr>
+              <p:cNvPr id="34" name="Rectangle 33"/>
+              <p:cNvSpPr/>
+              <p:nvPr/>
+            </p:nvSpPr>
+            <p:spPr>
+              <a:xfrm flipV="1">
+                <a:off x="1393500" y="1584000"/>
+                <a:ext cx="45720" cy="467400"/>
+              </a:xfrm>
+              <a:prstGeom prst="rect">
+                <a:avLst/>
+              </a:prstGeom>
+              <a:solidFill>
+                <a:srgbClr val="FF9933"/>
+              </a:solidFill>
+              <a:ln>
+                <a:noFill/>
+              </a:ln>
+            </p:spPr>
+            <p:style>
+              <a:lnRef idx="2">
+                <a:schemeClr val="accent1">
+                  <a:shade val="50000"/>
+                </a:schemeClr>
+              </a:lnRef>
+              <a:fillRef idx="1">
+                <a:schemeClr val="accent1"/>
+              </a:fillRef>
+              <a:effectRef idx="0">
+                <a:schemeClr val="accent1"/>
+              </a:effectRef>
+              <a:fontRef idx="minor">
+                <a:schemeClr val="lt1"/>
+              </a:fontRef>
+            </p:style>
+            <p:txBody>
+              <a:bodyPr rtlCol="0" anchor="ctr"/>
+              <a:lstStyle/>
+              <a:p>
+                <a:pPr algn="r"/>
+                <a:endParaRPr lang="en-IN"/>
+              </a:p>
+            </p:txBody>
+          </p:sp>
+        </p:grpSp>
+        <p:grpSp>
+          <p:nvGrpSpPr>
+            <p:cNvPr id="7" name="Group 6"/>
+            <p:cNvGrpSpPr/>
+            <p:nvPr/>
+          </p:nvGrpSpPr>
+          <p:grpSpPr>
+            <a:xfrm>
+              <a:off x="6610659" y="1642177"/>
+              <a:ext cx="720000" cy="3254974"/>
+              <a:chOff x="8975701" y="1618958"/>
+              <a:chExt cx="720000" cy="3241483"/>
+            </a:xfrm>
+          </p:grpSpPr>
+          <p:sp>
+            <p:nvSpPr>
+              <p:cNvPr id="30" name="Rectangle 29"/>
+              <p:cNvSpPr/>
+              <p:nvPr/>
+            </p:nvSpPr>
+            <p:spPr>
+              <a:xfrm>
+                <a:off x="8975701" y="1618958"/>
+                <a:ext cx="720000" cy="3241483"/>
+              </a:xfrm>
+              <a:prstGeom prst="rect">
+                <a:avLst/>
+              </a:prstGeom>
+              <a:solidFill>
+                <a:srgbClr val="FF9933"/>
+              </a:solidFill>
+              <a:ln>
+                <a:noFill/>
+              </a:ln>
+            </p:spPr>
+            <p:style>
+              <a:lnRef idx="2">
+                <a:schemeClr val="accent1">
+                  <a:shade val="50000"/>
+                </a:schemeClr>
+              </a:lnRef>
+              <a:fillRef idx="1">
+                <a:schemeClr val="accent1"/>
+              </a:fillRef>
+              <a:effectRef idx="0">
+                <a:schemeClr val="accent1"/>
+              </a:effectRef>
+              <a:fontRef idx="minor">
+                <a:schemeClr val="lt1"/>
+              </a:fontRef>
+            </p:style>
+            <p:txBody>
+              <a:bodyPr rtlCol="0" anchor="ctr"/>
+              <a:lstStyle/>
+              <a:p>
+                <a:pPr algn="r"/>
+                <a:endParaRPr lang="en-IN"/>
+              </a:p>
+            </p:txBody>
+          </p:sp>
+          <p:sp>
+            <p:nvSpPr>
+              <p:cNvPr id="31" name="Trapezoid 30"/>
+              <p:cNvSpPr/>
+              <p:nvPr/>
+            </p:nvSpPr>
+            <p:spPr>
+              <a:xfrm>
+                <a:off x="9178746" y="1941989"/>
+                <a:ext cx="239877" cy="168807"/>
+              </a:xfrm>
+              <a:prstGeom prst="trapezoid">
+                <a:avLst>
+                  <a:gd name="adj" fmla="val 95532"/>
+                </a:avLst>
+              </a:prstGeom>
+              <a:solidFill>
+                <a:srgbClr val="FF9933"/>
+              </a:solidFill>
+              <a:ln>
+                <a:noFill/>
+              </a:ln>
+            </p:spPr>
+            <p:style>
+              <a:lnRef idx="2">
+                <a:schemeClr val="accent1">
+                  <a:shade val="50000"/>
+                </a:schemeClr>
+              </a:lnRef>
+              <a:fillRef idx="1">
+                <a:schemeClr val="accent1"/>
+              </a:fillRef>
+              <a:effectRef idx="0">
+                <a:schemeClr val="accent1"/>
+              </a:effectRef>
+              <a:fontRef idx="minor">
+                <a:schemeClr val="lt1"/>
+              </a:fontRef>
+            </p:style>
+            <p:txBody>
+              <a:bodyPr rtlCol="0" anchor="ctr"/>
+              <a:lstStyle/>
+              <a:p>
+                <a:pPr algn="r"/>
+                <a:endParaRPr lang="en-IN"/>
+              </a:p>
+            </p:txBody>
+          </p:sp>
+        </p:grpSp>
+        <p:grpSp>
+          <p:nvGrpSpPr>
+            <p:cNvPr id="8" name="Group 7"/>
+            <p:cNvGrpSpPr/>
+            <p:nvPr/>
+          </p:nvGrpSpPr>
+          <p:grpSpPr>
+            <a:xfrm>
+              <a:off x="7405697" y="347037"/>
+              <a:ext cx="983631" cy="4538255"/>
+              <a:chOff x="7571082" y="1539001"/>
+              <a:chExt cx="720000" cy="4538255"/>
+            </a:xfrm>
+          </p:grpSpPr>
+          <p:sp>
+            <p:nvSpPr>
+              <p:cNvPr id="24" name="Trapezoid 23"/>
+              <p:cNvSpPr/>
+              <p:nvPr/>
+            </p:nvSpPr>
+            <p:spPr>
+              <a:xfrm>
+                <a:off x="7611122" y="2110796"/>
+                <a:ext cx="639918" cy="168807"/>
+              </a:xfrm>
+              <a:prstGeom prst="trapezoid">
+                <a:avLst>
+                  <a:gd name="adj" fmla="val 37696"/>
+                </a:avLst>
+              </a:prstGeom>
+              <a:solidFill>
+                <a:srgbClr val="FF9933"/>
+              </a:solidFill>
+              <a:ln>
+                <a:noFill/>
+              </a:ln>
+            </p:spPr>
+            <p:style>
+              <a:lnRef idx="2">
+                <a:schemeClr val="accent1">
+                  <a:shade val="50000"/>
+                </a:schemeClr>
+              </a:lnRef>
+              <a:fillRef idx="1">
+                <a:schemeClr val="accent1"/>
+              </a:fillRef>
+              <a:effectRef idx="0">
+                <a:schemeClr val="accent1"/>
+              </a:effectRef>
+              <a:fontRef idx="minor">
+                <a:schemeClr val="lt1"/>
+              </a:fontRef>
+            </p:style>
+            <p:txBody>
+              <a:bodyPr rtlCol="0" anchor="ctr"/>
+              <a:lstStyle/>
+              <a:p>
+                <a:pPr algn="r"/>
+                <a:endParaRPr lang="en-IN"/>
+              </a:p>
+            </p:txBody>
+          </p:sp>
+          <p:sp>
+            <p:nvSpPr>
+              <p:cNvPr id="25" name="Rectangle 24"/>
+              <p:cNvSpPr/>
+              <p:nvPr/>
+            </p:nvSpPr>
+            <p:spPr>
+              <a:xfrm>
+                <a:off x="7571082" y="2279603"/>
+                <a:ext cx="720000" cy="3797653"/>
+              </a:xfrm>
+              <a:prstGeom prst="rect">
+                <a:avLst/>
+              </a:prstGeom>
+              <a:solidFill>
+                <a:srgbClr val="FF9933"/>
+              </a:solidFill>
+              <a:ln>
+                <a:noFill/>
+              </a:ln>
+            </p:spPr>
+            <p:style>
+              <a:lnRef idx="2">
+                <a:schemeClr val="accent1">
+                  <a:shade val="50000"/>
+                </a:schemeClr>
+              </a:lnRef>
+              <a:fillRef idx="1">
+                <a:schemeClr val="accent1"/>
+              </a:fillRef>
+              <a:effectRef idx="0">
+                <a:schemeClr val="accent1"/>
+              </a:effectRef>
+              <a:fontRef idx="minor">
+                <a:schemeClr val="lt1"/>
+              </a:fontRef>
+            </p:style>
+            <p:txBody>
+              <a:bodyPr rtlCol="0" anchor="ctr"/>
+              <a:lstStyle/>
+              <a:p>
+                <a:pPr algn="r"/>
+                <a:endParaRPr lang="en-IN"/>
+              </a:p>
+            </p:txBody>
+          </p:sp>
+          <p:sp>
+            <p:nvSpPr>
+              <p:cNvPr id="26" name="Trapezoid 25"/>
+              <p:cNvSpPr/>
+              <p:nvPr/>
+            </p:nvSpPr>
+            <p:spPr>
+              <a:xfrm>
+                <a:off x="7740264" y="1941989"/>
+                <a:ext cx="380736" cy="168807"/>
+              </a:xfrm>
+              <a:prstGeom prst="trapezoid">
+                <a:avLst>
+                  <a:gd name="adj" fmla="val 32053"/>
+                </a:avLst>
+              </a:prstGeom>
+              <a:solidFill>
+                <a:srgbClr val="FF9933"/>
+              </a:solidFill>
+              <a:ln>
+                <a:noFill/>
+              </a:ln>
+            </p:spPr>
+            <p:style>
+              <a:lnRef idx="2">
+                <a:schemeClr val="accent1">
+                  <a:shade val="50000"/>
+                </a:schemeClr>
+              </a:lnRef>
+              <a:fillRef idx="1">
+                <a:schemeClr val="accent1"/>
+              </a:fillRef>
+              <a:effectRef idx="0">
+                <a:schemeClr val="accent1"/>
+              </a:effectRef>
+              <a:fontRef idx="minor">
+                <a:schemeClr val="lt1"/>
+              </a:fontRef>
+            </p:style>
+            <p:txBody>
+              <a:bodyPr rtlCol="0" anchor="ctr"/>
+              <a:lstStyle/>
+              <a:p>
+                <a:pPr algn="r"/>
+                <a:endParaRPr lang="en-IN"/>
+              </a:p>
+            </p:txBody>
+          </p:sp>
+          <p:sp>
+            <p:nvSpPr>
+              <p:cNvPr id="27" name="Trapezoid 26"/>
+              <p:cNvSpPr/>
+              <p:nvPr/>
+            </p:nvSpPr>
+            <p:spPr>
+              <a:xfrm>
+                <a:off x="7842638" y="1780007"/>
+                <a:ext cx="188362" cy="168807"/>
+              </a:xfrm>
+              <a:prstGeom prst="trapezoid">
+                <a:avLst>
+                  <a:gd name="adj" fmla="val 30642"/>
+                </a:avLst>
+              </a:prstGeom>
+              <a:solidFill>
+                <a:srgbClr val="FF9933"/>
+              </a:solidFill>
+              <a:ln>
+                <a:noFill/>
+              </a:ln>
+            </p:spPr>
+            <p:style>
+              <a:lnRef idx="2">
+                <a:schemeClr val="accent1">
+                  <a:shade val="50000"/>
+                </a:schemeClr>
+              </a:lnRef>
+              <a:fillRef idx="1">
+                <a:schemeClr val="accent1"/>
+              </a:fillRef>
+              <a:effectRef idx="0">
+                <a:schemeClr val="accent1"/>
+              </a:effectRef>
+              <a:fontRef idx="minor">
+                <a:schemeClr val="lt1"/>
+              </a:fontRef>
+            </p:style>
+            <p:txBody>
+              <a:bodyPr rtlCol="0" anchor="ctr"/>
+              <a:lstStyle/>
+              <a:p>
+                <a:pPr algn="r"/>
+                <a:endParaRPr lang="en-IN"/>
+              </a:p>
+            </p:txBody>
+          </p:sp>
+          <p:sp>
+            <p:nvSpPr>
+              <p:cNvPr id="28" name="Trapezoid 27"/>
+              <p:cNvSpPr/>
+              <p:nvPr/>
+            </p:nvSpPr>
+            <p:spPr>
+              <a:xfrm flipH="1">
+                <a:off x="7913959" y="1539001"/>
+                <a:ext cx="45719" cy="247832"/>
+              </a:xfrm>
+              <a:prstGeom prst="trapezoid">
+                <a:avLst>
+                  <a:gd name="adj" fmla="val 30642"/>
+                </a:avLst>
+              </a:prstGeom>
+              <a:solidFill>
+                <a:srgbClr val="FF9933"/>
+              </a:solidFill>
+              <a:ln>
+                <a:noFill/>
+              </a:ln>
+            </p:spPr>
+            <p:style>
+              <a:lnRef idx="2">
+                <a:schemeClr val="accent1">
+                  <a:shade val="50000"/>
+                </a:schemeClr>
+              </a:lnRef>
+              <a:fillRef idx="1">
+                <a:schemeClr val="accent1"/>
+              </a:fillRef>
+              <a:effectRef idx="0">
+                <a:schemeClr val="accent1"/>
+              </a:effectRef>
+              <a:fontRef idx="minor">
+                <a:schemeClr val="lt1"/>
+              </a:fontRef>
+            </p:style>
+            <p:txBody>
+              <a:bodyPr rtlCol="0" anchor="ctr"/>
+              <a:lstStyle/>
+              <a:p>
+                <a:pPr algn="r"/>
+                <a:endParaRPr lang="en-IN"/>
+              </a:p>
+            </p:txBody>
+          </p:sp>
+        </p:grpSp>
+        <p:grpSp>
+          <p:nvGrpSpPr>
+            <p:cNvPr id="9" name="Group 8"/>
+            <p:cNvGrpSpPr/>
+            <p:nvPr/>
+          </p:nvGrpSpPr>
+          <p:grpSpPr>
+            <a:xfrm>
+              <a:off x="5712664" y="1802969"/>
+              <a:ext cx="720000" cy="3082323"/>
+              <a:chOff x="8975701" y="1618958"/>
+              <a:chExt cx="720000" cy="3241483"/>
+            </a:xfrm>
+          </p:grpSpPr>
+          <p:sp>
+            <p:nvSpPr>
+              <p:cNvPr id="22" name="Rectangle 21"/>
+              <p:cNvSpPr/>
+              <p:nvPr/>
+            </p:nvSpPr>
+            <p:spPr>
+              <a:xfrm>
+                <a:off x="8975701" y="1618958"/>
+                <a:ext cx="720000" cy="3241483"/>
+              </a:xfrm>
+              <a:prstGeom prst="rect">
+                <a:avLst/>
+              </a:prstGeom>
+              <a:solidFill>
+                <a:srgbClr val="FF9933"/>
+              </a:solidFill>
+              <a:ln>
+                <a:noFill/>
+              </a:ln>
+            </p:spPr>
+            <p:style>
+              <a:lnRef idx="2">
+                <a:schemeClr val="accent1">
+                  <a:shade val="50000"/>
+                </a:schemeClr>
+              </a:lnRef>
+              <a:fillRef idx="1">
+                <a:schemeClr val="accent1"/>
+              </a:fillRef>
+              <a:effectRef idx="0">
+                <a:schemeClr val="accent1"/>
+              </a:effectRef>
+              <a:fontRef idx="minor">
+                <a:schemeClr val="lt1"/>
+              </a:fontRef>
+            </p:style>
+            <p:txBody>
+              <a:bodyPr rtlCol="0" anchor="ctr"/>
+              <a:lstStyle/>
+              <a:p>
+                <a:pPr algn="r"/>
+                <a:endParaRPr lang="en-IN"/>
+              </a:p>
+            </p:txBody>
+          </p:sp>
+          <p:sp>
+            <p:nvSpPr>
+              <p:cNvPr id="23" name="Trapezoid 22"/>
+              <p:cNvSpPr/>
+              <p:nvPr/>
+            </p:nvSpPr>
+            <p:spPr>
+              <a:xfrm>
+                <a:off x="9178746" y="1941989"/>
+                <a:ext cx="239877" cy="168807"/>
+              </a:xfrm>
+              <a:prstGeom prst="trapezoid">
+                <a:avLst>
+                  <a:gd name="adj" fmla="val 95532"/>
+                </a:avLst>
+              </a:prstGeom>
+              <a:solidFill>
+                <a:srgbClr val="FF9933"/>
+              </a:solidFill>
+              <a:ln>
+                <a:noFill/>
+              </a:ln>
+            </p:spPr>
+            <p:style>
+              <a:lnRef idx="2">
+                <a:schemeClr val="accent1">
+                  <a:shade val="50000"/>
+                </a:schemeClr>
+              </a:lnRef>
+              <a:fillRef idx="1">
+                <a:schemeClr val="accent1"/>
+              </a:fillRef>
+              <a:effectRef idx="0">
+                <a:schemeClr val="accent1"/>
+              </a:effectRef>
+              <a:fontRef idx="minor">
+                <a:schemeClr val="lt1"/>
+              </a:fontRef>
+            </p:style>
+            <p:txBody>
+              <a:bodyPr rtlCol="0" anchor="ctr"/>
+              <a:lstStyle/>
+              <a:p>
+                <a:pPr algn="r"/>
+                <a:endParaRPr lang="en-IN"/>
+              </a:p>
+            </p:txBody>
+          </p:sp>
+        </p:grpSp>
+        <p:grpSp>
+          <p:nvGrpSpPr>
+            <p:cNvPr id="10" name="Group 9"/>
+            <p:cNvGrpSpPr/>
+            <p:nvPr/>
+          </p:nvGrpSpPr>
+          <p:grpSpPr>
+            <a:xfrm>
+              <a:off x="2626821" y="1815911"/>
+              <a:ext cx="757016" cy="3082323"/>
+              <a:chOff x="8938685" y="1618958"/>
+              <a:chExt cx="757016" cy="3241483"/>
+            </a:xfrm>
+          </p:grpSpPr>
+          <p:sp>
+            <p:nvSpPr>
+              <p:cNvPr id="18" name="Trapezoid 17"/>
+              <p:cNvSpPr/>
+              <p:nvPr/>
+            </p:nvSpPr>
+            <p:spPr>
+              <a:xfrm>
+                <a:off x="8938685" y="2110796"/>
+                <a:ext cx="720000" cy="168807"/>
+              </a:xfrm>
+              <a:prstGeom prst="trapezoid">
+                <a:avLst>
+                  <a:gd name="adj" fmla="val 95532"/>
+                </a:avLst>
+              </a:prstGeom>
+              <a:solidFill>
+                <a:srgbClr val="FF9933"/>
+              </a:solidFill>
+              <a:ln>
+                <a:noFill/>
+              </a:ln>
+            </p:spPr>
+            <p:style>
+              <a:lnRef idx="2">
+                <a:schemeClr val="accent1">
+                  <a:shade val="50000"/>
+                </a:schemeClr>
+              </a:lnRef>
+              <a:fillRef idx="1">
+                <a:schemeClr val="accent1"/>
+              </a:fillRef>
+              <a:effectRef idx="0">
+                <a:schemeClr val="accent1"/>
+              </a:effectRef>
+              <a:fontRef idx="minor">
+                <a:schemeClr val="lt1"/>
+              </a:fontRef>
+            </p:style>
+            <p:txBody>
+              <a:bodyPr rtlCol="0" anchor="ctr"/>
+              <a:lstStyle/>
+              <a:p>
+                <a:pPr algn="r"/>
+                <a:endParaRPr lang="en-IN"/>
+              </a:p>
+            </p:txBody>
+          </p:sp>
+          <p:sp>
+            <p:nvSpPr>
+              <p:cNvPr id="19" name="Rectangle 18"/>
+              <p:cNvSpPr/>
+              <p:nvPr/>
+            </p:nvSpPr>
+            <p:spPr>
+              <a:xfrm>
+                <a:off x="8975701" y="1618958"/>
+                <a:ext cx="720000" cy="3241483"/>
+              </a:xfrm>
+              <a:prstGeom prst="rect">
+                <a:avLst/>
+              </a:prstGeom>
+              <a:solidFill>
+                <a:srgbClr val="FF9933"/>
+              </a:solidFill>
+              <a:ln>
+                <a:noFill/>
+              </a:ln>
+            </p:spPr>
+            <p:style>
+              <a:lnRef idx="2">
+                <a:schemeClr val="accent1">
+                  <a:shade val="50000"/>
+                </a:schemeClr>
+              </a:lnRef>
+              <a:fillRef idx="1">
+                <a:schemeClr val="accent1"/>
+              </a:fillRef>
+              <a:effectRef idx="0">
+                <a:schemeClr val="accent1"/>
+              </a:effectRef>
+              <a:fontRef idx="minor">
+                <a:schemeClr val="lt1"/>
+              </a:fontRef>
+            </p:style>
+            <p:txBody>
+              <a:bodyPr rtlCol="0" anchor="ctr"/>
+              <a:lstStyle/>
+              <a:p>
+                <a:pPr algn="r"/>
+                <a:endParaRPr lang="en-IN"/>
+              </a:p>
+            </p:txBody>
+          </p:sp>
+          <p:sp>
+            <p:nvSpPr>
+              <p:cNvPr id="20" name="Trapezoid 19"/>
+              <p:cNvSpPr/>
+              <p:nvPr/>
+            </p:nvSpPr>
+            <p:spPr>
+              <a:xfrm>
+                <a:off x="9178746" y="1941989"/>
+                <a:ext cx="239877" cy="168807"/>
+              </a:xfrm>
+              <a:prstGeom prst="trapezoid">
+                <a:avLst>
+                  <a:gd name="adj" fmla="val 95532"/>
+                </a:avLst>
+              </a:prstGeom>
+              <a:solidFill>
+                <a:srgbClr val="FF9933"/>
+              </a:solidFill>
+              <a:ln>
+                <a:noFill/>
+              </a:ln>
+            </p:spPr>
+            <p:style>
+              <a:lnRef idx="2">
+                <a:schemeClr val="accent1">
+                  <a:shade val="50000"/>
+                </a:schemeClr>
+              </a:lnRef>
+              <a:fillRef idx="1">
+                <a:schemeClr val="accent1"/>
+              </a:fillRef>
+              <a:effectRef idx="0">
+                <a:schemeClr val="accent1"/>
+              </a:effectRef>
+              <a:fontRef idx="minor">
+                <a:schemeClr val="lt1"/>
+              </a:fontRef>
+            </p:style>
+            <p:txBody>
+              <a:bodyPr rtlCol="0" anchor="ctr"/>
+              <a:lstStyle/>
+              <a:p>
+                <a:pPr algn="r"/>
+                <a:endParaRPr lang="en-IN"/>
+              </a:p>
+            </p:txBody>
+          </p:sp>
+        </p:grpSp>
+        <p:grpSp>
+          <p:nvGrpSpPr>
+            <p:cNvPr id="11" name="Group 10"/>
+            <p:cNvGrpSpPr/>
+            <p:nvPr/>
+          </p:nvGrpSpPr>
+          <p:grpSpPr>
+            <a:xfrm>
+              <a:off x="1811416" y="522194"/>
+              <a:ext cx="720000" cy="4351486"/>
+              <a:chOff x="9291000" y="747438"/>
+              <a:chExt cx="720000" cy="4351486"/>
+            </a:xfrm>
+          </p:grpSpPr>
+          <p:sp>
+            <p:nvSpPr>
+              <p:cNvPr id="15" name="Trapezoid 14"/>
+              <p:cNvSpPr/>
+              <p:nvPr/>
+            </p:nvSpPr>
+            <p:spPr>
+              <a:xfrm>
+                <a:off x="9291000" y="925902"/>
+                <a:ext cx="720000" cy="206562"/>
+              </a:xfrm>
+              <a:prstGeom prst="trapezoid">
+                <a:avLst>
+                  <a:gd name="adj" fmla="val 95532"/>
+                </a:avLst>
+              </a:prstGeom>
+              <a:solidFill>
+                <a:srgbClr val="FF9933"/>
+              </a:solidFill>
+              <a:ln>
+                <a:noFill/>
+              </a:ln>
+            </p:spPr>
+            <p:style>
+              <a:lnRef idx="2">
+                <a:schemeClr val="accent1">
+                  <a:shade val="50000"/>
+                </a:schemeClr>
+              </a:lnRef>
+              <a:fillRef idx="1">
+                <a:schemeClr val="accent1"/>
+              </a:fillRef>
+              <a:effectRef idx="0">
+                <a:schemeClr val="accent1"/>
+              </a:effectRef>
+              <a:fontRef idx="minor">
+                <a:schemeClr val="lt1"/>
+              </a:fontRef>
+            </p:style>
+            <p:txBody>
+              <a:bodyPr rtlCol="0" anchor="ctr"/>
+              <a:lstStyle/>
+              <a:p>
+                <a:pPr algn="r"/>
+                <a:endParaRPr lang="en-IN"/>
+              </a:p>
+            </p:txBody>
+          </p:sp>
+          <p:sp>
+            <p:nvSpPr>
+              <p:cNvPr id="16" name="Rectangle 15"/>
+              <p:cNvSpPr/>
+              <p:nvPr/>
+            </p:nvSpPr>
+            <p:spPr>
+              <a:xfrm>
+                <a:off x="9291000" y="1132464"/>
+                <a:ext cx="720000" cy="3966460"/>
+              </a:xfrm>
+              <a:prstGeom prst="rect">
+                <a:avLst/>
+              </a:prstGeom>
+              <a:solidFill>
+                <a:srgbClr val="FF9933"/>
+              </a:solidFill>
+              <a:ln>
+                <a:noFill/>
+              </a:ln>
+            </p:spPr>
+            <p:style>
+              <a:lnRef idx="2">
+                <a:schemeClr val="accent1">
+                  <a:shade val="50000"/>
+                </a:schemeClr>
+              </a:lnRef>
+              <a:fillRef idx="1">
+                <a:schemeClr val="accent1"/>
+              </a:fillRef>
+              <a:effectRef idx="0">
+                <a:schemeClr val="accent1"/>
+              </a:effectRef>
+              <a:fontRef idx="minor">
+                <a:schemeClr val="lt1"/>
+              </a:fontRef>
+            </p:style>
+            <p:txBody>
+              <a:bodyPr rtlCol="0" anchor="ctr"/>
+              <a:lstStyle/>
+              <a:p>
+                <a:pPr algn="r"/>
+                <a:endParaRPr lang="en-IN"/>
+              </a:p>
+            </p:txBody>
+          </p:sp>
+          <p:sp>
+            <p:nvSpPr>
+              <p:cNvPr id="17" name="Trapezoid 16"/>
+              <p:cNvSpPr/>
+              <p:nvPr/>
+            </p:nvSpPr>
+            <p:spPr>
+              <a:xfrm>
+                <a:off x="9531061" y="747438"/>
+                <a:ext cx="239877" cy="206562"/>
+              </a:xfrm>
+              <a:prstGeom prst="trapezoid">
+                <a:avLst>
+                  <a:gd name="adj" fmla="val 95532"/>
+                </a:avLst>
+              </a:prstGeom>
+              <a:solidFill>
+                <a:srgbClr val="FF9933"/>
+              </a:solidFill>
+              <a:ln>
+                <a:noFill/>
+              </a:ln>
+            </p:spPr>
+            <p:style>
+              <a:lnRef idx="2">
+                <a:schemeClr val="accent1">
+                  <a:shade val="50000"/>
+                </a:schemeClr>
+              </a:lnRef>
+              <a:fillRef idx="1">
+                <a:schemeClr val="accent1"/>
+              </a:fillRef>
+              <a:effectRef idx="0">
+                <a:schemeClr val="accent1"/>
+              </a:effectRef>
+              <a:fontRef idx="minor">
+                <a:schemeClr val="lt1"/>
+              </a:fontRef>
+            </p:style>
+            <p:txBody>
+              <a:bodyPr rtlCol="0" anchor="ctr"/>
+              <a:lstStyle/>
+              <a:p>
+                <a:pPr algn="r"/>
+                <a:endParaRPr lang="en-IN"/>
+              </a:p>
+            </p:txBody>
+          </p:sp>
+        </p:grpSp>
+        <p:grpSp>
+          <p:nvGrpSpPr>
+            <p:cNvPr id="12" name="Group 11"/>
+            <p:cNvGrpSpPr/>
+            <p:nvPr/>
+          </p:nvGrpSpPr>
+          <p:grpSpPr>
+            <a:xfrm>
+              <a:off x="10820228" y="629720"/>
+              <a:ext cx="724138" cy="4267431"/>
+              <a:chOff x="7983559" y="619992"/>
+              <a:chExt cx="724138" cy="4267431"/>
+            </a:xfrm>
+          </p:grpSpPr>
+          <p:sp>
+            <p:nvSpPr>
+              <p:cNvPr id="13" name="Rectangle 12"/>
+              <p:cNvSpPr/>
+              <p:nvPr/>
+            </p:nvSpPr>
+            <p:spPr>
+              <a:xfrm>
+                <a:off x="7987697" y="920963"/>
+                <a:ext cx="720000" cy="3966460"/>
+              </a:xfrm>
+              <a:prstGeom prst="rect">
+                <a:avLst/>
+              </a:prstGeom>
+              <a:solidFill>
+                <a:srgbClr val="FF9933"/>
+              </a:solidFill>
+              <a:ln>
+                <a:noFill/>
+              </a:ln>
+            </p:spPr>
+            <p:style>
+              <a:lnRef idx="2">
+                <a:schemeClr val="accent1">
+                  <a:shade val="50000"/>
+                </a:schemeClr>
+              </a:lnRef>
+              <a:fillRef idx="1">
+                <a:schemeClr val="accent1"/>
+              </a:fillRef>
+              <a:effectRef idx="0">
+                <a:schemeClr val="accent1"/>
+              </a:effectRef>
+              <a:fontRef idx="minor">
+                <a:schemeClr val="lt1"/>
+              </a:fontRef>
+            </p:style>
+            <p:txBody>
+              <a:bodyPr rtlCol="0" anchor="ctr"/>
+              <a:lstStyle/>
+              <a:p>
+                <a:pPr algn="r"/>
+                <a:endParaRPr lang="en-IN"/>
+              </a:p>
+            </p:txBody>
+          </p:sp>
+          <p:sp>
+            <p:nvSpPr>
+              <p:cNvPr id="14" name="Rectangle 43"/>
+              <p:cNvSpPr/>
+              <p:nvPr/>
+            </p:nvSpPr>
+            <p:spPr>
+              <a:xfrm>
+                <a:off x="7983559" y="619992"/>
+                <a:ext cx="710300" cy="314300"/>
+              </a:xfrm>
+              <a:prstGeom prst="rtTriangle">
+                <a:avLst/>
+              </a:prstGeom>
+              <a:solidFill>
+                <a:srgbClr val="FF9933"/>
+              </a:solidFill>
+              <a:ln>
+                <a:noFill/>
+              </a:ln>
+            </p:spPr>
+            <p:style>
+              <a:lnRef idx="2">
+                <a:schemeClr val="accent1">
+                  <a:shade val="50000"/>
+                </a:schemeClr>
+              </a:lnRef>
+              <a:fillRef idx="1">
+                <a:schemeClr val="accent1"/>
+              </a:fillRef>
+              <a:effectRef idx="0">
+                <a:schemeClr val="accent1"/>
+              </a:effectRef>
+              <a:fontRef idx="minor">
+                <a:schemeClr val="lt1"/>
+              </a:fontRef>
+            </p:style>
+            <p:txBody>
+              <a:bodyPr rtlCol="0" anchor="ctr"/>
+              <a:lstStyle/>
+              <a:p>
+                <a:pPr algn="r"/>
+                <a:endParaRPr lang="en-IN"/>
+              </a:p>
+            </p:txBody>
+          </p:sp>
+        </p:grpSp>
+      </p:grpSp>
     </p:spTree>
     <p:extLst>
       <p:ext uri="{BB962C8B-B14F-4D97-AF65-F5344CB8AC3E}">
         <p14:creationId xmlns:p14="http://schemas.microsoft.com/office/powerpoint/2010/main" val="2985002888"/>
+      </p:ext>
+    </p:extLst>
+  </p:cSld>
+  <p:clrMapOvr>
+    <a:masterClrMapping/>
+  </p:clrMapOvr>
+  <p:timing>
+    <p:tnLst>
+      <p:par>
+        <p:cTn id="1" dur="indefinite" restart="never" nodeType="tmRoot"/>
+      </p:par>
+    </p:tnLst>
+  </p:timing>
+</p:sld>
+</file>
+
+<file path=ppt/slides/slide14.xml><?xml version="1.0" encoding="utf-8"?>
+<p:sld xmlns:a="http://schemas.openxmlformats.org/drawingml/2006/main" xmlns:r="http://schemas.openxmlformats.org/officeDocument/2006/relationships" xmlns:p="http://schemas.openxmlformats.org/presentationml/2006/main">
+  <p:cSld>
+    <p:spTree>
+      <p:nvGrpSpPr>
+        <p:cNvPr id="1" name=""/>
+        <p:cNvGrpSpPr/>
+        <p:nvPr/>
+      </p:nvGrpSpPr>
+      <p:grpSpPr>
+        <a:xfrm>
+          <a:off x="0" y="0"/>
+          <a:ext cx="0" cy="0"/>
+          <a:chOff x="0" y="0"/>
+          <a:chExt cx="0" cy="0"/>
+        </a:xfrm>
+      </p:grpSpPr>
+      <p:grpSp>
+        <p:nvGrpSpPr>
+          <p:cNvPr id="27" name="Group 26"/>
+          <p:cNvGrpSpPr/>
+          <p:nvPr/>
+        </p:nvGrpSpPr>
+        <p:grpSpPr>
+          <a:xfrm>
+            <a:off x="1157748" y="1430526"/>
+            <a:ext cx="10878252" cy="3467260"/>
+            <a:chOff x="1157748" y="1430526"/>
+            <a:chExt cx="10878252" cy="3467260"/>
+          </a:xfrm>
+        </p:grpSpPr>
+        <p:sp>
+          <p:nvSpPr>
+            <p:cNvPr id="5" name="Rectangle 4"/>
+            <p:cNvSpPr/>
+            <p:nvPr/>
+          </p:nvSpPr>
+          <p:spPr>
+            <a:xfrm>
+              <a:off x="7556378" y="3091765"/>
+              <a:ext cx="3095322" cy="1779660"/>
+            </a:xfrm>
+            <a:prstGeom prst="rect">
+              <a:avLst/>
+            </a:prstGeom>
+            <a:solidFill>
+              <a:schemeClr val="bg2"/>
+            </a:solidFill>
+            <a:ln>
+              <a:noFill/>
+            </a:ln>
+            <a:effectLst/>
+          </p:spPr>
+          <p:style>
+            <a:lnRef idx="2">
+              <a:schemeClr val="accent1">
+                <a:shade val="50000"/>
+              </a:schemeClr>
+            </a:lnRef>
+            <a:fillRef idx="1">
+              <a:schemeClr val="accent1"/>
+            </a:fillRef>
+            <a:effectRef idx="0">
+              <a:schemeClr val="accent1"/>
+            </a:effectRef>
+            <a:fontRef idx="minor">
+              <a:schemeClr val="lt1"/>
+            </a:fontRef>
+          </p:style>
+          <p:txBody>
+            <a:bodyPr rtlCol="0" anchor="ctr"/>
+            <a:lstStyle/>
+            <a:p>
+              <a:pPr algn="ctr"/>
+              <a:endParaRPr lang="en-IN"/>
+            </a:p>
+          </p:txBody>
+        </p:sp>
+        <p:sp>
+          <p:nvSpPr>
+            <p:cNvPr id="6" name="Rectangle 5"/>
+            <p:cNvSpPr/>
+            <p:nvPr/>
+          </p:nvSpPr>
+          <p:spPr>
+            <a:xfrm>
+              <a:off x="4252714" y="3545526"/>
+              <a:ext cx="900905" cy="1323423"/>
+            </a:xfrm>
+            <a:prstGeom prst="rect">
+              <a:avLst/>
+            </a:prstGeom>
+            <a:solidFill>
+              <a:schemeClr val="bg2"/>
+            </a:solidFill>
+            <a:ln>
+              <a:noFill/>
+            </a:ln>
+            <a:effectLst/>
+          </p:spPr>
+          <p:style>
+            <a:lnRef idx="2">
+              <a:schemeClr val="accent1">
+                <a:shade val="50000"/>
+              </a:schemeClr>
+            </a:lnRef>
+            <a:fillRef idx="1">
+              <a:schemeClr val="accent1"/>
+            </a:fillRef>
+            <a:effectRef idx="0">
+              <a:schemeClr val="accent1"/>
+            </a:effectRef>
+            <a:fontRef idx="minor">
+              <a:schemeClr val="lt1"/>
+            </a:fontRef>
+          </p:style>
+          <p:txBody>
+            <a:bodyPr rtlCol="0" anchor="ctr"/>
+            <a:lstStyle/>
+            <a:p>
+              <a:pPr algn="ctr"/>
+              <a:endParaRPr lang="en-IN"/>
+            </a:p>
+          </p:txBody>
+        </p:sp>
+        <p:grpSp>
+          <p:nvGrpSpPr>
+            <p:cNvPr id="7" name="Group 6"/>
+            <p:cNvGrpSpPr/>
+            <p:nvPr/>
+          </p:nvGrpSpPr>
+          <p:grpSpPr>
+            <a:xfrm>
+              <a:off x="5251634" y="1430526"/>
+              <a:ext cx="686152" cy="3438423"/>
+              <a:chOff x="2496000" y="583509"/>
+              <a:chExt cx="720000" cy="4303914"/>
+            </a:xfrm>
+            <a:solidFill>
+              <a:schemeClr val="bg2"/>
+            </a:solidFill>
+            <a:effectLst/>
+          </p:grpSpPr>
+          <p:sp>
+            <p:nvSpPr>
+              <p:cNvPr id="25" name="Rectangle 24"/>
+              <p:cNvSpPr/>
+              <p:nvPr/>
+            </p:nvSpPr>
+            <p:spPr>
+              <a:xfrm>
+                <a:off x="2496000" y="1269000"/>
+                <a:ext cx="720000" cy="3618423"/>
+              </a:xfrm>
+              <a:prstGeom prst="rect">
+                <a:avLst/>
+              </a:prstGeom>
+              <a:grpFill/>
+              <a:ln>
+                <a:noFill/>
+              </a:ln>
+            </p:spPr>
+            <p:style>
+              <a:lnRef idx="2">
+                <a:schemeClr val="accent1">
+                  <a:shade val="50000"/>
+                </a:schemeClr>
+              </a:lnRef>
+              <a:fillRef idx="1">
+                <a:schemeClr val="accent1"/>
+              </a:fillRef>
+              <a:effectRef idx="0">
+                <a:schemeClr val="accent1"/>
+              </a:effectRef>
+              <a:fontRef idx="minor">
+                <a:schemeClr val="lt1"/>
+              </a:fontRef>
+            </p:style>
+            <p:txBody>
+              <a:bodyPr rtlCol="0" anchor="ctr"/>
+              <a:lstStyle/>
+              <a:p>
+                <a:pPr algn="ctr"/>
+                <a:endParaRPr lang="en-IN"/>
+              </a:p>
+            </p:txBody>
+          </p:sp>
+          <p:sp>
+            <p:nvSpPr>
+              <p:cNvPr id="26" name="Rectangle 25"/>
+              <p:cNvSpPr/>
+              <p:nvPr/>
+            </p:nvSpPr>
+            <p:spPr>
+              <a:xfrm flipV="1">
+                <a:off x="2631000" y="583509"/>
+                <a:ext cx="27093" cy="792891"/>
+              </a:xfrm>
+              <a:prstGeom prst="rect">
+                <a:avLst/>
+              </a:prstGeom>
+              <a:grpFill/>
+              <a:ln>
+                <a:noFill/>
+              </a:ln>
+            </p:spPr>
+            <p:style>
+              <a:lnRef idx="2">
+                <a:schemeClr val="accent1">
+                  <a:shade val="50000"/>
+                </a:schemeClr>
+              </a:lnRef>
+              <a:fillRef idx="1">
+                <a:schemeClr val="accent1"/>
+              </a:fillRef>
+              <a:effectRef idx="0">
+                <a:schemeClr val="accent1"/>
+              </a:effectRef>
+              <a:fontRef idx="minor">
+                <a:schemeClr val="lt1"/>
+              </a:fontRef>
+            </p:style>
+            <p:txBody>
+              <a:bodyPr rtlCol="0" anchor="ctr"/>
+              <a:lstStyle/>
+              <a:p>
+                <a:pPr algn="ctr"/>
+                <a:endParaRPr lang="en-IN"/>
+              </a:p>
+            </p:txBody>
+          </p:sp>
+        </p:grpSp>
+        <p:grpSp>
+          <p:nvGrpSpPr>
+            <p:cNvPr id="8" name="Group 7"/>
+            <p:cNvGrpSpPr/>
+            <p:nvPr/>
+          </p:nvGrpSpPr>
+          <p:grpSpPr>
+            <a:xfrm>
+              <a:off x="3202903" y="2298541"/>
+              <a:ext cx="965161" cy="2599245"/>
+              <a:chOff x="1056000" y="1584000"/>
+              <a:chExt cx="720000" cy="3325129"/>
+            </a:xfrm>
+            <a:solidFill>
+              <a:schemeClr val="bg2"/>
+            </a:solidFill>
+            <a:effectLst/>
+          </p:grpSpPr>
+          <p:sp>
+            <p:nvSpPr>
+              <p:cNvPr id="22" name="Rectangle 21"/>
+              <p:cNvSpPr/>
+              <p:nvPr/>
+            </p:nvSpPr>
+            <p:spPr>
+              <a:xfrm>
+                <a:off x="1056000" y="2529000"/>
+                <a:ext cx="720000" cy="2380129"/>
+              </a:xfrm>
+              <a:prstGeom prst="rect">
+                <a:avLst/>
+              </a:prstGeom>
+              <a:grpFill/>
+              <a:ln>
+                <a:noFill/>
+              </a:ln>
+            </p:spPr>
+            <p:style>
+              <a:lnRef idx="2">
+                <a:schemeClr val="accent1">
+                  <a:shade val="50000"/>
+                </a:schemeClr>
+              </a:lnRef>
+              <a:fillRef idx="1">
+                <a:schemeClr val="accent1"/>
+              </a:fillRef>
+              <a:effectRef idx="0">
+                <a:schemeClr val="accent1"/>
+              </a:effectRef>
+              <a:fontRef idx="minor">
+                <a:schemeClr val="lt1"/>
+              </a:fontRef>
+            </p:style>
+            <p:txBody>
+              <a:bodyPr rtlCol="0" anchor="ctr"/>
+              <a:lstStyle/>
+              <a:p>
+                <a:pPr algn="ctr"/>
+                <a:endParaRPr lang="en-IN" u="sng" dirty="0"/>
+              </a:p>
+            </p:txBody>
+          </p:sp>
+          <p:sp>
+            <p:nvSpPr>
+              <p:cNvPr id="23" name="Isosceles Triangle 22"/>
+              <p:cNvSpPr/>
+              <p:nvPr/>
+            </p:nvSpPr>
+            <p:spPr>
+              <a:xfrm>
+                <a:off x="1056000" y="1944000"/>
+                <a:ext cx="720000" cy="596153"/>
+              </a:xfrm>
+              <a:prstGeom prst="triangle">
+                <a:avLst/>
+              </a:prstGeom>
+              <a:grpFill/>
+              <a:ln>
+                <a:noFill/>
+              </a:ln>
+            </p:spPr>
+            <p:style>
+              <a:lnRef idx="2">
+                <a:schemeClr val="accent1">
+                  <a:shade val="50000"/>
+                </a:schemeClr>
+              </a:lnRef>
+              <a:fillRef idx="1">
+                <a:schemeClr val="accent1"/>
+              </a:fillRef>
+              <a:effectRef idx="0">
+                <a:schemeClr val="accent1"/>
+              </a:effectRef>
+              <a:fontRef idx="minor">
+                <a:schemeClr val="lt1"/>
+              </a:fontRef>
+            </p:style>
+            <p:txBody>
+              <a:bodyPr rtlCol="0" anchor="ctr"/>
+              <a:lstStyle/>
+              <a:p>
+                <a:pPr algn="ctr"/>
+                <a:endParaRPr lang="en-IN"/>
+              </a:p>
+            </p:txBody>
+          </p:sp>
+          <p:sp>
+            <p:nvSpPr>
+              <p:cNvPr id="24" name="Rectangle 23"/>
+              <p:cNvSpPr/>
+              <p:nvPr/>
+            </p:nvSpPr>
+            <p:spPr>
+              <a:xfrm flipV="1">
+                <a:off x="1393500" y="1584000"/>
+                <a:ext cx="45720" cy="467400"/>
+              </a:xfrm>
+              <a:prstGeom prst="rect">
+                <a:avLst/>
+              </a:prstGeom>
+              <a:grpFill/>
+              <a:ln>
+                <a:noFill/>
+              </a:ln>
+            </p:spPr>
+            <p:style>
+              <a:lnRef idx="2">
+                <a:schemeClr val="accent1">
+                  <a:shade val="50000"/>
+                </a:schemeClr>
+              </a:lnRef>
+              <a:fillRef idx="1">
+                <a:schemeClr val="accent1"/>
+              </a:fillRef>
+              <a:effectRef idx="0">
+                <a:schemeClr val="accent1"/>
+              </a:effectRef>
+              <a:fontRef idx="minor">
+                <a:schemeClr val="lt1"/>
+              </a:fontRef>
+            </p:style>
+            <p:txBody>
+              <a:bodyPr rtlCol="0" anchor="ctr"/>
+              <a:lstStyle/>
+              <a:p>
+                <a:pPr algn="ctr"/>
+                <a:endParaRPr lang="en-IN"/>
+              </a:p>
+            </p:txBody>
+          </p:sp>
+        </p:grpSp>
+        <p:grpSp>
+          <p:nvGrpSpPr>
+            <p:cNvPr id="9" name="Group 8"/>
+            <p:cNvGrpSpPr/>
+            <p:nvPr/>
+          </p:nvGrpSpPr>
+          <p:grpSpPr>
+            <a:xfrm>
+              <a:off x="6166806" y="1568612"/>
+              <a:ext cx="1184858" cy="3309661"/>
+              <a:chOff x="3936000" y="2446334"/>
+              <a:chExt cx="1080000" cy="2422666"/>
+            </a:xfrm>
+            <a:solidFill>
+              <a:schemeClr val="bg2"/>
+            </a:solidFill>
+            <a:effectLst/>
+          </p:grpSpPr>
+          <p:sp>
+            <p:nvSpPr>
+              <p:cNvPr id="20" name="Rectangle 19"/>
+              <p:cNvSpPr/>
+              <p:nvPr/>
+            </p:nvSpPr>
+            <p:spPr>
+              <a:xfrm>
+                <a:off x="3936000" y="2979000"/>
+                <a:ext cx="1080000" cy="1890000"/>
+              </a:xfrm>
+              <a:prstGeom prst="rect">
+                <a:avLst/>
+              </a:prstGeom>
+              <a:grpFill/>
+              <a:ln>
+                <a:noFill/>
+              </a:ln>
+            </p:spPr>
+            <p:style>
+              <a:lnRef idx="2">
+                <a:schemeClr val="accent1">
+                  <a:shade val="50000"/>
+                </a:schemeClr>
+              </a:lnRef>
+              <a:fillRef idx="1">
+                <a:schemeClr val="accent1"/>
+              </a:fillRef>
+              <a:effectRef idx="0">
+                <a:schemeClr val="accent1"/>
+              </a:effectRef>
+              <a:fontRef idx="minor">
+                <a:schemeClr val="lt1"/>
+              </a:fontRef>
+            </p:style>
+            <p:txBody>
+              <a:bodyPr rtlCol="0" anchor="ctr"/>
+              <a:lstStyle/>
+              <a:p>
+                <a:pPr algn="ctr"/>
+                <a:endParaRPr lang="en-IN"/>
+              </a:p>
+            </p:txBody>
+          </p:sp>
+          <p:sp>
+            <p:nvSpPr>
+              <p:cNvPr id="21" name="Isosceles Triangle 20"/>
+              <p:cNvSpPr/>
+              <p:nvPr/>
+            </p:nvSpPr>
+            <p:spPr>
+              <a:xfrm>
+                <a:off x="4074829" y="2446334"/>
+                <a:ext cx="802342" cy="545475"/>
+              </a:xfrm>
+              <a:prstGeom prst="triangle">
+                <a:avLst/>
+              </a:prstGeom>
+              <a:grpFill/>
+              <a:ln>
+                <a:noFill/>
+              </a:ln>
+            </p:spPr>
+            <p:style>
+              <a:lnRef idx="2">
+                <a:schemeClr val="accent1">
+                  <a:shade val="50000"/>
+                </a:schemeClr>
+              </a:lnRef>
+              <a:fillRef idx="1">
+                <a:schemeClr val="accent1"/>
+              </a:fillRef>
+              <a:effectRef idx="0">
+                <a:schemeClr val="accent1"/>
+              </a:effectRef>
+              <a:fontRef idx="minor">
+                <a:schemeClr val="lt1"/>
+              </a:fontRef>
+            </p:style>
+            <p:txBody>
+              <a:bodyPr rtlCol="0" anchor="ctr"/>
+              <a:lstStyle/>
+              <a:p>
+                <a:pPr algn="ctr"/>
+                <a:endParaRPr lang="en-IN"/>
+              </a:p>
+            </p:txBody>
+          </p:sp>
+        </p:grpSp>
+        <p:grpSp>
+          <p:nvGrpSpPr>
+            <p:cNvPr id="10" name="Group 9"/>
+            <p:cNvGrpSpPr/>
+            <p:nvPr/>
+          </p:nvGrpSpPr>
+          <p:grpSpPr>
+            <a:xfrm>
+              <a:off x="2301837" y="2800421"/>
+              <a:ext cx="757016" cy="2077852"/>
+              <a:chOff x="8938685" y="1618958"/>
+              <a:chExt cx="757016" cy="3241483"/>
+            </a:xfrm>
+            <a:solidFill>
+              <a:schemeClr val="bg2"/>
+            </a:solidFill>
+            <a:effectLst/>
+          </p:grpSpPr>
+          <p:sp>
+            <p:nvSpPr>
+              <p:cNvPr id="17" name="Trapezoid 16"/>
+              <p:cNvSpPr/>
+              <p:nvPr/>
+            </p:nvSpPr>
+            <p:spPr>
+              <a:xfrm>
+                <a:off x="8938685" y="2110796"/>
+                <a:ext cx="720000" cy="168807"/>
+              </a:xfrm>
+              <a:prstGeom prst="trapezoid">
+                <a:avLst>
+                  <a:gd name="adj" fmla="val 95532"/>
+                </a:avLst>
+              </a:prstGeom>
+              <a:grpFill/>
+              <a:ln>
+                <a:noFill/>
+              </a:ln>
+            </p:spPr>
+            <p:style>
+              <a:lnRef idx="2">
+                <a:schemeClr val="accent1">
+                  <a:shade val="50000"/>
+                </a:schemeClr>
+              </a:lnRef>
+              <a:fillRef idx="1">
+                <a:schemeClr val="accent1"/>
+              </a:fillRef>
+              <a:effectRef idx="0">
+                <a:schemeClr val="accent1"/>
+              </a:effectRef>
+              <a:fontRef idx="minor">
+                <a:schemeClr val="lt1"/>
+              </a:fontRef>
+            </p:style>
+            <p:txBody>
+              <a:bodyPr rtlCol="0" anchor="ctr"/>
+              <a:lstStyle/>
+              <a:p>
+                <a:pPr algn="ctr"/>
+                <a:endParaRPr lang="en-IN"/>
+              </a:p>
+            </p:txBody>
+          </p:sp>
+          <p:sp>
+            <p:nvSpPr>
+              <p:cNvPr id="18" name="Rectangle 17"/>
+              <p:cNvSpPr/>
+              <p:nvPr/>
+            </p:nvSpPr>
+            <p:spPr>
+              <a:xfrm>
+                <a:off x="8975701" y="1618958"/>
+                <a:ext cx="720000" cy="3241483"/>
+              </a:xfrm>
+              <a:prstGeom prst="rect">
+                <a:avLst/>
+              </a:prstGeom>
+              <a:grpFill/>
+              <a:ln>
+                <a:noFill/>
+              </a:ln>
+            </p:spPr>
+            <p:style>
+              <a:lnRef idx="2">
+                <a:schemeClr val="accent1">
+                  <a:shade val="50000"/>
+                </a:schemeClr>
+              </a:lnRef>
+              <a:fillRef idx="1">
+                <a:schemeClr val="accent1"/>
+              </a:fillRef>
+              <a:effectRef idx="0">
+                <a:schemeClr val="accent1"/>
+              </a:effectRef>
+              <a:fontRef idx="minor">
+                <a:schemeClr val="lt1"/>
+              </a:fontRef>
+            </p:style>
+            <p:txBody>
+              <a:bodyPr rtlCol="0" anchor="ctr"/>
+              <a:lstStyle/>
+              <a:p>
+                <a:pPr algn="ctr"/>
+                <a:endParaRPr lang="en-IN"/>
+              </a:p>
+            </p:txBody>
+          </p:sp>
+          <p:sp>
+            <p:nvSpPr>
+              <p:cNvPr id="19" name="Trapezoid 18"/>
+              <p:cNvSpPr/>
+              <p:nvPr/>
+            </p:nvSpPr>
+            <p:spPr>
+              <a:xfrm>
+                <a:off x="9178746" y="1941989"/>
+                <a:ext cx="239877" cy="168807"/>
+              </a:xfrm>
+              <a:prstGeom prst="trapezoid">
+                <a:avLst>
+                  <a:gd name="adj" fmla="val 95532"/>
+                </a:avLst>
+              </a:prstGeom>
+              <a:grpFill/>
+              <a:ln>
+                <a:noFill/>
+              </a:ln>
+            </p:spPr>
+            <p:style>
+              <a:lnRef idx="2">
+                <a:schemeClr val="accent1">
+                  <a:shade val="50000"/>
+                </a:schemeClr>
+              </a:lnRef>
+              <a:fillRef idx="1">
+                <a:schemeClr val="accent1"/>
+              </a:fillRef>
+              <a:effectRef idx="0">
+                <a:schemeClr val="accent1"/>
+              </a:effectRef>
+              <a:fontRef idx="minor">
+                <a:schemeClr val="lt1"/>
+              </a:fontRef>
+            </p:style>
+            <p:txBody>
+              <a:bodyPr rtlCol="0" anchor="ctr"/>
+              <a:lstStyle/>
+              <a:p>
+                <a:pPr algn="ctr"/>
+                <a:endParaRPr lang="en-IN"/>
+              </a:p>
+            </p:txBody>
+          </p:sp>
+        </p:grpSp>
+        <p:grpSp>
+          <p:nvGrpSpPr>
+            <p:cNvPr id="11" name="Group 10"/>
+            <p:cNvGrpSpPr/>
+            <p:nvPr/>
+          </p:nvGrpSpPr>
+          <p:grpSpPr>
+            <a:xfrm>
+              <a:off x="10821000" y="1607253"/>
+              <a:ext cx="1215000" cy="3271020"/>
+              <a:chOff x="2496000" y="583509"/>
+              <a:chExt cx="720000" cy="4303914"/>
+            </a:xfrm>
+            <a:solidFill>
+              <a:schemeClr val="bg2"/>
+            </a:solidFill>
+            <a:effectLst/>
+          </p:grpSpPr>
+          <p:sp>
+            <p:nvSpPr>
+              <p:cNvPr id="15" name="Rectangle 14"/>
+              <p:cNvSpPr/>
+              <p:nvPr/>
+            </p:nvSpPr>
+            <p:spPr>
+              <a:xfrm>
+                <a:off x="2496000" y="1269000"/>
+                <a:ext cx="720000" cy="3618423"/>
+              </a:xfrm>
+              <a:prstGeom prst="rect">
+                <a:avLst/>
+              </a:prstGeom>
+              <a:grpFill/>
+              <a:ln>
+                <a:noFill/>
+              </a:ln>
+            </p:spPr>
+            <p:style>
+              <a:lnRef idx="2">
+                <a:schemeClr val="accent1">
+                  <a:shade val="50000"/>
+                </a:schemeClr>
+              </a:lnRef>
+              <a:fillRef idx="1">
+                <a:schemeClr val="accent1"/>
+              </a:fillRef>
+              <a:effectRef idx="0">
+                <a:schemeClr val="accent1"/>
+              </a:effectRef>
+              <a:fontRef idx="minor">
+                <a:schemeClr val="lt1"/>
+              </a:fontRef>
+            </p:style>
+            <p:txBody>
+              <a:bodyPr rtlCol="0" anchor="ctr"/>
+              <a:lstStyle/>
+              <a:p>
+                <a:pPr algn="ctr"/>
+                <a:endParaRPr lang="en-IN"/>
+              </a:p>
+            </p:txBody>
+          </p:sp>
+          <p:sp>
+            <p:nvSpPr>
+              <p:cNvPr id="16" name="Rectangle 15"/>
+              <p:cNvSpPr/>
+              <p:nvPr/>
+            </p:nvSpPr>
+            <p:spPr>
+              <a:xfrm flipV="1">
+                <a:off x="2631000" y="583509"/>
+                <a:ext cx="27093" cy="792891"/>
+              </a:xfrm>
+              <a:prstGeom prst="rect">
+                <a:avLst/>
+              </a:prstGeom>
+              <a:grpFill/>
+              <a:ln>
+                <a:noFill/>
+              </a:ln>
+            </p:spPr>
+            <p:style>
+              <a:lnRef idx="2">
+                <a:schemeClr val="accent1">
+                  <a:shade val="50000"/>
+                </a:schemeClr>
+              </a:lnRef>
+              <a:fillRef idx="1">
+                <a:schemeClr val="accent1"/>
+              </a:fillRef>
+              <a:effectRef idx="0">
+                <a:schemeClr val="accent1"/>
+              </a:effectRef>
+              <a:fontRef idx="minor">
+                <a:schemeClr val="lt1"/>
+              </a:fontRef>
+            </p:style>
+            <p:txBody>
+              <a:bodyPr rtlCol="0" anchor="ctr"/>
+              <a:lstStyle/>
+              <a:p>
+                <a:pPr algn="ctr"/>
+                <a:endParaRPr lang="en-IN"/>
+              </a:p>
+            </p:txBody>
+          </p:sp>
+        </p:grpSp>
+        <p:grpSp>
+          <p:nvGrpSpPr>
+            <p:cNvPr id="12" name="Group 11"/>
+            <p:cNvGrpSpPr/>
+            <p:nvPr/>
+          </p:nvGrpSpPr>
+          <p:grpSpPr>
+            <a:xfrm>
+              <a:off x="1157748" y="2207546"/>
+              <a:ext cx="1032791" cy="2661403"/>
+              <a:chOff x="7960340" y="597000"/>
+              <a:chExt cx="720000" cy="4280760"/>
+            </a:xfrm>
+            <a:solidFill>
+              <a:schemeClr val="bg2"/>
+            </a:solidFill>
+            <a:effectLst/>
+          </p:grpSpPr>
+          <p:sp>
+            <p:nvSpPr>
+              <p:cNvPr id="13" name="Rectangle 12"/>
+              <p:cNvSpPr/>
+              <p:nvPr/>
+            </p:nvSpPr>
+            <p:spPr>
+              <a:xfrm>
+                <a:off x="7960340" y="911300"/>
+                <a:ext cx="720000" cy="3966460"/>
+              </a:xfrm>
+              <a:prstGeom prst="rect">
+                <a:avLst/>
+              </a:prstGeom>
+              <a:grpFill/>
+              <a:ln>
+                <a:noFill/>
+              </a:ln>
+            </p:spPr>
+            <p:style>
+              <a:lnRef idx="2">
+                <a:schemeClr val="accent1">
+                  <a:shade val="50000"/>
+                </a:schemeClr>
+              </a:lnRef>
+              <a:fillRef idx="1">
+                <a:schemeClr val="accent1"/>
+              </a:fillRef>
+              <a:effectRef idx="0">
+                <a:schemeClr val="accent1"/>
+              </a:effectRef>
+              <a:fontRef idx="minor">
+                <a:schemeClr val="lt1"/>
+              </a:fontRef>
+            </p:style>
+            <p:txBody>
+              <a:bodyPr rtlCol="0" anchor="ctr"/>
+              <a:lstStyle/>
+              <a:p>
+                <a:pPr algn="ctr"/>
+                <a:endParaRPr lang="en-IN"/>
+              </a:p>
+            </p:txBody>
+          </p:sp>
+          <p:sp>
+            <p:nvSpPr>
+              <p:cNvPr id="14" name="Rectangle 43"/>
+              <p:cNvSpPr/>
+              <p:nvPr/>
+            </p:nvSpPr>
+            <p:spPr>
+              <a:xfrm>
+                <a:off x="7964600" y="597000"/>
+                <a:ext cx="710300" cy="314300"/>
+              </a:xfrm>
+              <a:prstGeom prst="rtTriangle">
+                <a:avLst/>
+              </a:prstGeom>
+              <a:grpFill/>
+              <a:ln>
+                <a:noFill/>
+              </a:ln>
+            </p:spPr>
+            <p:style>
+              <a:lnRef idx="2">
+                <a:schemeClr val="accent1">
+                  <a:shade val="50000"/>
+                </a:schemeClr>
+              </a:lnRef>
+              <a:fillRef idx="1">
+                <a:schemeClr val="accent1"/>
+              </a:fillRef>
+              <a:effectRef idx="0">
+                <a:schemeClr val="accent1"/>
+              </a:effectRef>
+              <a:fontRef idx="minor">
+                <a:schemeClr val="lt1"/>
+              </a:fontRef>
+            </p:style>
+            <p:txBody>
+              <a:bodyPr rtlCol="0" anchor="ctr"/>
+              <a:lstStyle/>
+              <a:p>
+                <a:pPr algn="ctr"/>
+                <a:endParaRPr lang="en-IN"/>
+              </a:p>
+            </p:txBody>
+          </p:sp>
+        </p:grpSp>
+      </p:grpSp>
+    </p:spTree>
+    <p:extLst>
+      <p:ext uri="{BB962C8B-B14F-4D97-AF65-F5344CB8AC3E}">
+        <p14:creationId xmlns:p14="http://schemas.microsoft.com/office/powerpoint/2010/main" val="3627404951"/>
       </p:ext>
     </p:extLst>
   </p:cSld>

</xml_diff>